<commit_message>
Updated docs and ppt
</commit_message>
<xml_diff>
--- a/docs/Electrical Impedance Tomography.pptx
+++ b/docs/Electrical Impedance Tomography.pptx
@@ -5,19 +5,20 @@
     <p:sldMasterId id="2147483648" r:id="rId1"/>
   </p:sldMasterIdLst>
   <p:notesMasterIdLst>
-    <p:notesMasterId r:id="rId12"/>
+    <p:notesMasterId r:id="rId13"/>
   </p:notesMasterIdLst>
   <p:sldIdLst>
     <p:sldId id="256" r:id="rId2"/>
     <p:sldId id="257" r:id="rId3"/>
     <p:sldId id="258" r:id="rId4"/>
-    <p:sldId id="259" r:id="rId5"/>
-    <p:sldId id="261" r:id="rId6"/>
-    <p:sldId id="260" r:id="rId7"/>
+    <p:sldId id="266" r:id="rId5"/>
+    <p:sldId id="259" r:id="rId6"/>
+    <p:sldId id="261" r:id="rId7"/>
     <p:sldId id="262" r:id="rId8"/>
-    <p:sldId id="263" r:id="rId9"/>
-    <p:sldId id="264" r:id="rId10"/>
-    <p:sldId id="265" r:id="rId11"/>
+    <p:sldId id="260" r:id="rId9"/>
+    <p:sldId id="263" r:id="rId10"/>
+    <p:sldId id="264" r:id="rId11"/>
+    <p:sldId id="265" r:id="rId12"/>
   </p:sldIdLst>
   <p:sldSz cx="12192000" cy="6858000"/>
   <p:notesSz cx="6858000" cy="9144000"/>
@@ -116,6 +117,11 @@
       </a:defRPr>
     </a:lvl9pPr>
   </p:defaultTextStyle>
+  <p:extLst>
+    <p:ext uri="{EFAFB233-063F-42B5-8137-9DF3F51BA10A}">
+      <p15:sldGuideLst xmlns:p15="http://schemas.microsoft.com/office/powerpoint/2012/main"/>
+    </p:ext>
+  </p:extLst>
 </p:presentation>
 </file>
 
@@ -201,7 +207,7 @@
           <a:p>
             <a:fld id="{92661277-661F-48A4-921D-E6294FBCB460}" type="datetimeFigureOut">
               <a:rPr lang="en-IN" smtClean="0"/>
-              <a:t>16-07-2018</a:t>
+              <a:t>17-07-2018</a:t>
             </a:fld>
             <a:endParaRPr lang="en-IN"/>
           </a:p>
@@ -615,7 +621,7 @@
           <a:p>
             <a:r>
               <a:rPr lang="en-IN" b="1" dirty="0"/>
-              <a:t>OpenCV: </a:t>
+              <a:t>Impedance: </a:t>
             </a:r>
             <a:r>
               <a:rPr lang="en-US" sz="1200" b="0" i="0" kern="1200" dirty="0">
@@ -627,7 +633,7 @@
                 <a:ea typeface="+mn-ea"/>
                 <a:cs typeface="+mn-cs"/>
               </a:rPr>
-              <a:t>Open Source Computer Vision Library</a:t>
+              <a:t>the effective resistance of an electric circuit or component to alternating current, arising from the combined effects of ohmic resistance and reactance.</a:t>
             </a:r>
             <a:endParaRPr lang="en-IN" b="1" dirty="0"/>
           </a:p>
@@ -659,7 +665,7 @@
     </p:spTree>
     <p:extLst>
       <p:ext uri="{BB962C8B-B14F-4D97-AF65-F5344CB8AC3E}">
-        <p14:creationId xmlns:p14="http://schemas.microsoft.com/office/powerpoint/2010/main" val="3599802437"/>
+        <p14:creationId xmlns:p14="http://schemas.microsoft.com/office/powerpoint/2010/main" val="2812619706"/>
       </p:ext>
     </p:extLst>
   </p:cSld>
@@ -714,16 +720,8 @@
           <a:lstStyle/>
           <a:p>
             <a:r>
-              <a:rPr lang="en-US" sz="1200" b="1" i="0" kern="1200" dirty="0" err="1">
-                <a:solidFill>
-                  <a:schemeClr val="tx1"/>
-                </a:solidFill>
-                <a:effectLst/>
-                <a:latin typeface="+mn-lt"/>
-                <a:ea typeface="+mn-ea"/>
-                <a:cs typeface="+mn-cs"/>
-              </a:rPr>
-              <a:t>Linespace</a:t>
+              <a:rPr lang="en-IN" b="1" dirty="0"/>
+              <a:t>OpenCV: </a:t>
             </a:r>
             <a:r>
               <a:rPr lang="en-US" sz="1200" b="0" i="0" kern="1200" dirty="0">
@@ -735,159 +733,8 @@
                 <a:ea typeface="+mn-ea"/>
                 <a:cs typeface="+mn-cs"/>
               </a:rPr>
-              <a:t>: Returns evenly spaced numbers over a specified interval.</a:t>
-            </a:r>
-          </a:p>
-          <a:p>
-            <a:r>
-              <a:rPr lang="en-US" sz="1200" b="0" i="0" kern="1200" dirty="0">
-                <a:solidFill>
-                  <a:schemeClr val="tx1"/>
-                </a:solidFill>
-                <a:effectLst/>
-                <a:latin typeface="+mn-lt"/>
-                <a:ea typeface="+mn-ea"/>
-                <a:cs typeface="+mn-cs"/>
-              </a:rPr>
-              <a:t>Returns </a:t>
-            </a:r>
-            <a:r>
-              <a:rPr lang="en-US" sz="1200" b="0" i="1" kern="1200" dirty="0">
-                <a:solidFill>
-                  <a:schemeClr val="tx1"/>
-                </a:solidFill>
-                <a:effectLst/>
-                <a:latin typeface="+mn-lt"/>
-                <a:ea typeface="+mn-ea"/>
-                <a:cs typeface="+mn-cs"/>
-              </a:rPr>
-              <a:t>num</a:t>
-            </a:r>
-            <a:r>
-              <a:rPr lang="en-US" sz="1200" b="0" i="0" kern="1200" dirty="0">
-                <a:solidFill>
-                  <a:schemeClr val="tx1"/>
-                </a:solidFill>
-                <a:effectLst/>
-                <a:latin typeface="+mn-lt"/>
-                <a:ea typeface="+mn-ea"/>
-                <a:cs typeface="+mn-cs"/>
-              </a:rPr>
-              <a:t> evenly spaced samples, calculated over the interval [</a:t>
-            </a:r>
-            <a:r>
-              <a:rPr lang="en-US" sz="1200" b="0" i="1" kern="1200" dirty="0">
-                <a:solidFill>
-                  <a:schemeClr val="tx1"/>
-                </a:solidFill>
-                <a:effectLst/>
-                <a:latin typeface="+mn-lt"/>
-                <a:ea typeface="+mn-ea"/>
-                <a:cs typeface="+mn-cs"/>
-              </a:rPr>
-              <a:t>start</a:t>
-            </a:r>
-            <a:r>
-              <a:rPr lang="en-US" sz="1200" b="0" i="0" kern="1200" dirty="0">
-                <a:solidFill>
-                  <a:schemeClr val="tx1"/>
-                </a:solidFill>
-                <a:effectLst/>
-                <a:latin typeface="+mn-lt"/>
-                <a:ea typeface="+mn-ea"/>
-                <a:cs typeface="+mn-cs"/>
-              </a:rPr>
-              <a:t>, </a:t>
-            </a:r>
-            <a:r>
-              <a:rPr lang="en-US" sz="1200" b="0" i="1" kern="1200" dirty="0">
-                <a:solidFill>
-                  <a:schemeClr val="tx1"/>
-                </a:solidFill>
-                <a:effectLst/>
-                <a:latin typeface="+mn-lt"/>
-                <a:ea typeface="+mn-ea"/>
-                <a:cs typeface="+mn-cs"/>
-              </a:rPr>
-              <a:t>stop</a:t>
-            </a:r>
-            <a:r>
-              <a:rPr lang="en-US" sz="1200" b="0" i="0" kern="1200" dirty="0">
-                <a:solidFill>
-                  <a:schemeClr val="tx1"/>
-                </a:solidFill>
-                <a:effectLst/>
-                <a:latin typeface="+mn-lt"/>
-                <a:ea typeface="+mn-ea"/>
-                <a:cs typeface="+mn-cs"/>
-              </a:rPr>
-              <a:t>].</a:t>
-            </a:r>
-          </a:p>
-          <a:p>
-            <a:endParaRPr lang="en-IN" dirty="0"/>
-          </a:p>
-          <a:p>
-            <a:r>
-              <a:rPr lang="en-IN" b="1" dirty="0" err="1"/>
-              <a:t>Meshgrid</a:t>
-            </a:r>
-            <a:r>
-              <a:rPr lang="en-IN" b="1" dirty="0"/>
-              <a:t>: </a:t>
-            </a:r>
-            <a:r>
-              <a:rPr lang="en-US" sz="1200" b="0" i="0" kern="1200" dirty="0">
-                <a:solidFill>
-                  <a:schemeClr val="tx1"/>
-                </a:solidFill>
-                <a:effectLst/>
-                <a:latin typeface="+mn-lt"/>
-                <a:ea typeface="+mn-ea"/>
-                <a:cs typeface="+mn-cs"/>
-              </a:rPr>
-              <a:t>Returns coordinate matrices from coordinate vectors.</a:t>
-            </a:r>
-          </a:p>
-          <a:p>
-            <a:r>
-              <a:rPr lang="en-US" sz="1200" b="0" i="0" kern="1200" dirty="0">
-                <a:solidFill>
-                  <a:schemeClr val="tx1"/>
-                </a:solidFill>
-                <a:effectLst/>
-                <a:latin typeface="+mn-lt"/>
-                <a:ea typeface="+mn-ea"/>
-                <a:cs typeface="+mn-cs"/>
-              </a:rPr>
-              <a:t>Make N-D coordinate arrays for vectorized evaluations of N-D scalar/vector fields over N-D grids, given one-dimensional coordinate arrays x1, x2,…, </a:t>
-            </a:r>
-            <a:r>
-              <a:rPr lang="en-US" sz="1200" b="0" i="0" kern="1200" dirty="0" err="1">
-                <a:solidFill>
-                  <a:schemeClr val="tx1"/>
-                </a:solidFill>
-                <a:effectLst/>
-                <a:latin typeface="+mn-lt"/>
-                <a:ea typeface="+mn-ea"/>
-                <a:cs typeface="+mn-cs"/>
-              </a:rPr>
-              <a:t>xn</a:t>
-            </a:r>
-            <a:r>
-              <a:rPr lang="en-US" sz="1200" b="0" i="0" kern="1200" dirty="0">
-                <a:solidFill>
-                  <a:schemeClr val="tx1"/>
-                </a:solidFill>
-                <a:effectLst/>
-                <a:latin typeface="+mn-lt"/>
-                <a:ea typeface="+mn-ea"/>
-                <a:cs typeface="+mn-cs"/>
-              </a:rPr>
-              <a:t>.</a:t>
-            </a:r>
-          </a:p>
-          <a:p>
+              <a:t>Open Source Computer Vision Library</a:t>
+            </a:r>
             <a:endParaRPr lang="en-IN" b="1" dirty="0"/>
           </a:p>
         </p:txBody>
@@ -918,7 +765,7 @@
     </p:spTree>
     <p:extLst>
       <p:ext uri="{BB962C8B-B14F-4D97-AF65-F5344CB8AC3E}">
-        <p14:creationId xmlns:p14="http://schemas.microsoft.com/office/powerpoint/2010/main" val="2529591234"/>
+        <p14:creationId xmlns:p14="http://schemas.microsoft.com/office/powerpoint/2010/main" val="3599802437"/>
       </p:ext>
     </p:extLst>
   </p:cSld>
@@ -972,7 +819,182 @@
           <a:bodyPr/>
           <a:lstStyle/>
           <a:p>
+            <a:r>
+              <a:rPr lang="en-US" sz="1200" b="1" i="0" kern="1200" dirty="0" err="1">
+                <a:solidFill>
+                  <a:schemeClr val="tx1"/>
+                </a:solidFill>
+                <a:effectLst/>
+                <a:latin typeface="+mn-lt"/>
+                <a:ea typeface="+mn-ea"/>
+                <a:cs typeface="+mn-cs"/>
+              </a:rPr>
+              <a:t>Linespace</a:t>
+            </a:r>
+            <a:r>
+              <a:rPr lang="en-US" sz="1200" b="0" i="0" kern="1200" dirty="0">
+                <a:solidFill>
+                  <a:schemeClr val="tx1"/>
+                </a:solidFill>
+                <a:effectLst/>
+                <a:latin typeface="+mn-lt"/>
+                <a:ea typeface="+mn-ea"/>
+                <a:cs typeface="+mn-cs"/>
+              </a:rPr>
+              <a:t>: Returns evenly spaced numbers over a specified interval.</a:t>
+            </a:r>
+          </a:p>
+          <a:p>
+            <a:r>
+              <a:rPr lang="en-US" sz="1200" b="0" i="0" kern="1200" dirty="0">
+                <a:solidFill>
+                  <a:schemeClr val="tx1"/>
+                </a:solidFill>
+                <a:effectLst/>
+                <a:latin typeface="+mn-lt"/>
+                <a:ea typeface="+mn-ea"/>
+                <a:cs typeface="+mn-cs"/>
+              </a:rPr>
+              <a:t>Returns </a:t>
+            </a:r>
+            <a:r>
+              <a:rPr lang="en-US" sz="1200" b="0" i="1" kern="1200" dirty="0">
+                <a:solidFill>
+                  <a:schemeClr val="tx1"/>
+                </a:solidFill>
+                <a:effectLst/>
+                <a:latin typeface="+mn-lt"/>
+                <a:ea typeface="+mn-ea"/>
+                <a:cs typeface="+mn-cs"/>
+              </a:rPr>
+              <a:t>num</a:t>
+            </a:r>
+            <a:r>
+              <a:rPr lang="en-US" sz="1200" b="0" i="0" kern="1200" dirty="0">
+                <a:solidFill>
+                  <a:schemeClr val="tx1"/>
+                </a:solidFill>
+                <a:effectLst/>
+                <a:latin typeface="+mn-lt"/>
+                <a:ea typeface="+mn-ea"/>
+                <a:cs typeface="+mn-cs"/>
+              </a:rPr>
+              <a:t> evenly spaced samples, calculated over the interval [</a:t>
+            </a:r>
+            <a:r>
+              <a:rPr lang="en-US" sz="1200" b="0" i="1" kern="1200" dirty="0">
+                <a:solidFill>
+                  <a:schemeClr val="tx1"/>
+                </a:solidFill>
+                <a:effectLst/>
+                <a:latin typeface="+mn-lt"/>
+                <a:ea typeface="+mn-ea"/>
+                <a:cs typeface="+mn-cs"/>
+              </a:rPr>
+              <a:t>start</a:t>
+            </a:r>
+            <a:r>
+              <a:rPr lang="en-US" sz="1200" b="0" i="0" kern="1200" dirty="0">
+                <a:solidFill>
+                  <a:schemeClr val="tx1"/>
+                </a:solidFill>
+                <a:effectLst/>
+                <a:latin typeface="+mn-lt"/>
+                <a:ea typeface="+mn-ea"/>
+                <a:cs typeface="+mn-cs"/>
+              </a:rPr>
+              <a:t>, </a:t>
+            </a:r>
+            <a:r>
+              <a:rPr lang="en-US" sz="1200" b="0" i="1" kern="1200" dirty="0">
+                <a:solidFill>
+                  <a:schemeClr val="tx1"/>
+                </a:solidFill>
+                <a:effectLst/>
+                <a:latin typeface="+mn-lt"/>
+                <a:ea typeface="+mn-ea"/>
+                <a:cs typeface="+mn-cs"/>
+              </a:rPr>
+              <a:t>stop</a:t>
+            </a:r>
+            <a:r>
+              <a:rPr lang="en-US" sz="1200" b="0" i="0" kern="1200" dirty="0">
+                <a:solidFill>
+                  <a:schemeClr val="tx1"/>
+                </a:solidFill>
+                <a:effectLst/>
+                <a:latin typeface="+mn-lt"/>
+                <a:ea typeface="+mn-ea"/>
+                <a:cs typeface="+mn-cs"/>
+              </a:rPr>
+              <a:t>].</a:t>
+            </a:r>
+          </a:p>
+          <a:p>
             <a:endParaRPr lang="en-IN" dirty="0"/>
+          </a:p>
+          <a:p>
+            <a:r>
+              <a:rPr lang="en-IN" b="1" dirty="0" err="1"/>
+              <a:t>Meshgrid</a:t>
+            </a:r>
+            <a:r>
+              <a:rPr lang="en-IN" b="1" dirty="0"/>
+              <a:t>: </a:t>
+            </a:r>
+            <a:r>
+              <a:rPr lang="en-US" sz="1200" b="0" i="0" kern="1200" dirty="0">
+                <a:solidFill>
+                  <a:schemeClr val="tx1"/>
+                </a:solidFill>
+                <a:effectLst/>
+                <a:latin typeface="+mn-lt"/>
+                <a:ea typeface="+mn-ea"/>
+                <a:cs typeface="+mn-cs"/>
+              </a:rPr>
+              <a:t>Returns coordinate matrices from coordinate vectors.</a:t>
+            </a:r>
+          </a:p>
+          <a:p>
+            <a:r>
+              <a:rPr lang="en-US" sz="1200" b="0" i="0" kern="1200" dirty="0">
+                <a:solidFill>
+                  <a:schemeClr val="tx1"/>
+                </a:solidFill>
+                <a:effectLst/>
+                <a:latin typeface="+mn-lt"/>
+                <a:ea typeface="+mn-ea"/>
+                <a:cs typeface="+mn-cs"/>
+              </a:rPr>
+              <a:t>Make N-D coordinate arrays for vectorized evaluations of N-D scalar/vector fields over N-D grids, given one-dimensional coordinate arrays x1, x2,…, </a:t>
+            </a:r>
+            <a:r>
+              <a:rPr lang="en-US" sz="1200" b="0" i="0" kern="1200" dirty="0" err="1">
+                <a:solidFill>
+                  <a:schemeClr val="tx1"/>
+                </a:solidFill>
+                <a:effectLst/>
+                <a:latin typeface="+mn-lt"/>
+                <a:ea typeface="+mn-ea"/>
+                <a:cs typeface="+mn-cs"/>
+              </a:rPr>
+              <a:t>xn</a:t>
+            </a:r>
+            <a:r>
+              <a:rPr lang="en-US" sz="1200" b="0" i="0" kern="1200" dirty="0">
+                <a:solidFill>
+                  <a:schemeClr val="tx1"/>
+                </a:solidFill>
+                <a:effectLst/>
+                <a:latin typeface="+mn-lt"/>
+                <a:ea typeface="+mn-ea"/>
+                <a:cs typeface="+mn-cs"/>
+              </a:rPr>
+              <a:t>.</a:t>
+            </a:r>
+          </a:p>
+          <a:p>
+            <a:endParaRPr lang="en-IN" b="1" dirty="0"/>
           </a:p>
         </p:txBody>
       </p:sp>
@@ -1002,7 +1024,7 @@
     </p:spTree>
     <p:extLst>
       <p:ext uri="{BB962C8B-B14F-4D97-AF65-F5344CB8AC3E}">
-        <p14:creationId xmlns:p14="http://schemas.microsoft.com/office/powerpoint/2010/main" val="2166395261"/>
+        <p14:creationId xmlns:p14="http://schemas.microsoft.com/office/powerpoint/2010/main" val="2529591234"/>
       </p:ext>
     </p:extLst>
   </p:cSld>
@@ -1148,23 +1170,7 @@
           <a:bodyPr/>
           <a:lstStyle/>
           <a:p>
-            <a:r>
-              <a:rPr lang="en-IN" b="1" dirty="0"/>
-              <a:t>Cross Validation: </a:t>
-            </a:r>
-            <a:r>
-              <a:rPr lang="en-US" sz="1200" b="0" i="0" kern="1200" dirty="0">
-                <a:solidFill>
-                  <a:schemeClr val="tx1"/>
-                </a:solidFill>
-                <a:effectLst/>
-                <a:latin typeface="+mn-lt"/>
-                <a:ea typeface="+mn-ea"/>
-                <a:cs typeface="+mn-cs"/>
-              </a:rPr>
-              <a:t>Cross-validation is a statistical method used to estimate the skill of machine learning models</a:t>
-            </a:r>
-            <a:endParaRPr lang="en-IN" b="0" dirty="0"/>
+            <a:endParaRPr lang="en-IN" dirty="0"/>
           </a:p>
         </p:txBody>
       </p:sp>
@@ -1194,7 +1200,7 @@
     </p:spTree>
     <p:extLst>
       <p:ext uri="{BB962C8B-B14F-4D97-AF65-F5344CB8AC3E}">
-        <p14:creationId xmlns:p14="http://schemas.microsoft.com/office/powerpoint/2010/main" val="146885307"/>
+        <p14:creationId xmlns:p14="http://schemas.microsoft.com/office/powerpoint/2010/main" val="2166395261"/>
       </p:ext>
     </p:extLst>
   </p:cSld>
@@ -1249,6 +1255,106 @@
           <a:lstStyle/>
           <a:p>
             <a:r>
+              <a:rPr lang="en-IN" b="1" dirty="0"/>
+              <a:t>Cross Validation: </a:t>
+            </a:r>
+            <a:r>
+              <a:rPr lang="en-US" sz="1200" b="0" i="0" kern="1200" dirty="0">
+                <a:solidFill>
+                  <a:schemeClr val="tx1"/>
+                </a:solidFill>
+                <a:effectLst/>
+                <a:latin typeface="+mn-lt"/>
+                <a:ea typeface="+mn-ea"/>
+                <a:cs typeface="+mn-cs"/>
+              </a:rPr>
+              <a:t>Cross-validation is a statistical method used to estimate the skill of machine learning models</a:t>
+            </a:r>
+            <a:endParaRPr lang="en-IN" b="0" dirty="0"/>
+          </a:p>
+        </p:txBody>
+      </p:sp>
+      <p:sp>
+        <p:nvSpPr>
+          <p:cNvPr id="4" name="Slide Number Placeholder 3"/>
+          <p:cNvSpPr>
+            <a:spLocks noGrp="1"/>
+          </p:cNvSpPr>
+          <p:nvPr>
+            <p:ph type="sldNum" sz="quarter" idx="10"/>
+          </p:nvPr>
+        </p:nvSpPr>
+        <p:spPr/>
+        <p:txBody>
+          <a:bodyPr/>
+          <a:lstStyle/>
+          <a:p>
+            <a:fld id="{E492E516-AE13-4312-B068-B98DA096AE8C}" type="slidenum">
+              <a:rPr lang="en-IN" smtClean="0"/>
+              <a:t>9</a:t>
+            </a:fld>
+            <a:endParaRPr lang="en-IN"/>
+          </a:p>
+        </p:txBody>
+      </p:sp>
+    </p:spTree>
+    <p:extLst>
+      <p:ext uri="{BB962C8B-B14F-4D97-AF65-F5344CB8AC3E}">
+        <p14:creationId xmlns:p14="http://schemas.microsoft.com/office/powerpoint/2010/main" val="146885307"/>
+      </p:ext>
+    </p:extLst>
+  </p:cSld>
+  <p:clrMapOvr>
+    <a:masterClrMapping/>
+  </p:clrMapOvr>
+</p:notes>
+</file>
+
+<file path=ppt/notesSlides/notesSlide8.xml><?xml version="1.0" encoding="utf-8"?>
+<p:notes xmlns:a="http://schemas.openxmlformats.org/drawingml/2006/main" xmlns:r="http://schemas.openxmlformats.org/officeDocument/2006/relationships" xmlns:p="http://schemas.openxmlformats.org/presentationml/2006/main">
+  <p:cSld>
+    <p:spTree>
+      <p:nvGrpSpPr>
+        <p:cNvPr id="1" name=""/>
+        <p:cNvGrpSpPr/>
+        <p:nvPr/>
+      </p:nvGrpSpPr>
+      <p:grpSpPr>
+        <a:xfrm>
+          <a:off x="0" y="0"/>
+          <a:ext cx="0" cy="0"/>
+          <a:chOff x="0" y="0"/>
+          <a:chExt cx="0" cy="0"/>
+        </a:xfrm>
+      </p:grpSpPr>
+      <p:sp>
+        <p:nvSpPr>
+          <p:cNvPr id="2" name="Slide Image Placeholder 1"/>
+          <p:cNvSpPr>
+            <a:spLocks noGrp="1" noRot="1" noChangeAspect="1"/>
+          </p:cNvSpPr>
+          <p:nvPr>
+            <p:ph type="sldImg"/>
+          </p:nvPr>
+        </p:nvSpPr>
+        <p:spPr/>
+      </p:sp>
+      <p:sp>
+        <p:nvSpPr>
+          <p:cNvPr id="3" name="Notes Placeholder 2"/>
+          <p:cNvSpPr>
+            <a:spLocks noGrp="1"/>
+          </p:cNvSpPr>
+          <p:nvPr>
+            <p:ph type="body" idx="1"/>
+          </p:nvPr>
+        </p:nvSpPr>
+        <p:spPr/>
+        <p:txBody>
+          <a:bodyPr/>
+          <a:lstStyle/>
+          <a:p>
+            <a:r>
               <a:rPr lang="en-IN" sz="1200" b="1" kern="1200" dirty="0">
                 <a:solidFill>
                   <a:schemeClr val="tx1"/>
@@ -1557,7 +1663,7 @@
           <a:p>
             <a:fld id="{E492E516-AE13-4312-B068-B98DA096AE8C}" type="slidenum">
               <a:rPr lang="en-IN" smtClean="0"/>
-              <a:t>10</a:t>
+              <a:t>11</a:t>
             </a:fld>
             <a:endParaRPr lang="en-IN"/>
           </a:p>
@@ -1725,7 +1831,7 @@
           <a:p>
             <a:fld id="{C318855C-2999-4B66-B01B-C34BC234F170}" type="datetimeFigureOut">
               <a:rPr lang="en-IN" smtClean="0"/>
-              <a:t>16-07-2018</a:t>
+              <a:t>17-07-2018</a:t>
             </a:fld>
             <a:endParaRPr lang="en-IN"/>
           </a:p>
@@ -1925,7 +2031,7 @@
           <a:p>
             <a:fld id="{C318855C-2999-4B66-B01B-C34BC234F170}" type="datetimeFigureOut">
               <a:rPr lang="en-IN" smtClean="0"/>
-              <a:t>16-07-2018</a:t>
+              <a:t>17-07-2018</a:t>
             </a:fld>
             <a:endParaRPr lang="en-IN"/>
           </a:p>
@@ -2135,7 +2241,7 @@
           <a:p>
             <a:fld id="{C318855C-2999-4B66-B01B-C34BC234F170}" type="datetimeFigureOut">
               <a:rPr lang="en-IN" smtClean="0"/>
-              <a:t>16-07-2018</a:t>
+              <a:t>17-07-2018</a:t>
             </a:fld>
             <a:endParaRPr lang="en-IN"/>
           </a:p>
@@ -2335,7 +2441,7 @@
           <a:p>
             <a:fld id="{C318855C-2999-4B66-B01B-C34BC234F170}" type="datetimeFigureOut">
               <a:rPr lang="en-IN" smtClean="0"/>
-              <a:t>16-07-2018</a:t>
+              <a:t>17-07-2018</a:t>
             </a:fld>
             <a:endParaRPr lang="en-IN"/>
           </a:p>
@@ -2611,7 +2717,7 @@
           <a:p>
             <a:fld id="{C318855C-2999-4B66-B01B-C34BC234F170}" type="datetimeFigureOut">
               <a:rPr lang="en-IN" smtClean="0"/>
-              <a:t>16-07-2018</a:t>
+              <a:t>17-07-2018</a:t>
             </a:fld>
             <a:endParaRPr lang="en-IN"/>
           </a:p>
@@ -2879,7 +2985,7 @@
           <a:p>
             <a:fld id="{C318855C-2999-4B66-B01B-C34BC234F170}" type="datetimeFigureOut">
               <a:rPr lang="en-IN" smtClean="0"/>
-              <a:t>16-07-2018</a:t>
+              <a:t>17-07-2018</a:t>
             </a:fld>
             <a:endParaRPr lang="en-IN"/>
           </a:p>
@@ -3294,7 +3400,7 @@
           <a:p>
             <a:fld id="{C318855C-2999-4B66-B01B-C34BC234F170}" type="datetimeFigureOut">
               <a:rPr lang="en-IN" smtClean="0"/>
-              <a:t>16-07-2018</a:t>
+              <a:t>17-07-2018</a:t>
             </a:fld>
             <a:endParaRPr lang="en-IN"/>
           </a:p>
@@ -3436,7 +3542,7 @@
           <a:p>
             <a:fld id="{C318855C-2999-4B66-B01B-C34BC234F170}" type="datetimeFigureOut">
               <a:rPr lang="en-IN" smtClean="0"/>
-              <a:t>16-07-2018</a:t>
+              <a:t>17-07-2018</a:t>
             </a:fld>
             <a:endParaRPr lang="en-IN"/>
           </a:p>
@@ -3549,7 +3655,7 @@
           <a:p>
             <a:fld id="{C318855C-2999-4B66-B01B-C34BC234F170}" type="datetimeFigureOut">
               <a:rPr lang="en-IN" smtClean="0"/>
-              <a:t>16-07-2018</a:t>
+              <a:t>17-07-2018</a:t>
             </a:fld>
             <a:endParaRPr lang="en-IN"/>
           </a:p>
@@ -3862,7 +3968,7 @@
           <a:p>
             <a:fld id="{C318855C-2999-4B66-B01B-C34BC234F170}" type="datetimeFigureOut">
               <a:rPr lang="en-IN" smtClean="0"/>
-              <a:t>16-07-2018</a:t>
+              <a:t>17-07-2018</a:t>
             </a:fld>
             <a:endParaRPr lang="en-IN"/>
           </a:p>
@@ -4151,7 +4257,7 @@
           <a:p>
             <a:fld id="{C318855C-2999-4B66-B01B-C34BC234F170}" type="datetimeFigureOut">
               <a:rPr lang="en-IN" smtClean="0"/>
-              <a:t>16-07-2018</a:t>
+              <a:t>17-07-2018</a:t>
             </a:fld>
             <a:endParaRPr lang="en-IN"/>
           </a:p>
@@ -4394,7 +4500,7 @@
           <a:p>
             <a:fld id="{C318855C-2999-4B66-B01B-C34BC234F170}" type="datetimeFigureOut">
               <a:rPr lang="en-IN" smtClean="0"/>
-              <a:t>16-07-2018</a:t>
+              <a:t>17-07-2018</a:t>
             </a:fld>
             <a:endParaRPr lang="en-IN"/>
           </a:p>
@@ -4829,18 +4935,28 @@
         </p:nvSpPr>
         <p:spPr>
           <a:xfrm>
-            <a:off x="1524000" y="1438373"/>
-            <a:ext cx="9144000" cy="2387600"/>
+            <a:off x="0" y="1438373"/>
+            <a:ext cx="12192000" cy="2387600"/>
           </a:xfrm>
         </p:spPr>
         <p:txBody>
-          <a:bodyPr/>
-          <a:lstStyle/>
-          <a:p>
-            <a:r>
-              <a:rPr lang="en-IN" dirty="0"/>
-              <a:t>Electrical Impedance Tomography</a:t>
-            </a:r>
+          <a:bodyPr>
+            <a:normAutofit/>
+          </a:bodyPr>
+          <a:lstStyle/>
+          <a:p>
+            <a:r>
+              <a:rPr lang="en-IN" sz="4800" b="1" dirty="0"/>
+              <a:t>Classifying Electrical Impedance Tomography </a:t>
+            </a:r>
+            <a:br>
+              <a:rPr lang="en-IN" sz="4800" dirty="0"/>
+            </a:br>
+            <a:r>
+              <a:rPr lang="en-IN" sz="4800" b="1" dirty="0"/>
+              <a:t>images by resistances based on contours</a:t>
+            </a:r>
+            <a:endParaRPr lang="en-IN" sz="4800" dirty="0"/>
           </a:p>
         </p:txBody>
       </p:sp>
@@ -4862,24 +4978,89 @@
         </p:nvSpPr>
         <p:spPr>
           <a:xfrm>
-            <a:off x="1524000" y="4497777"/>
-            <a:ext cx="9144000" cy="1655762"/>
+            <a:off x="787400" y="4497777"/>
+            <a:ext cx="10617200" cy="1655762"/>
           </a:xfrm>
         </p:spPr>
         <p:txBody>
-          <a:bodyPr/>
-          <a:lstStyle/>
-          <a:p>
-            <a:r>
-              <a:rPr lang="en-IN" dirty="0"/>
-              <a:t>Identifying tumours (or defective regions) in </a:t>
-            </a:r>
-          </a:p>
-          <a:p>
-            <a:r>
-              <a:rPr lang="en-IN" dirty="0"/>
-              <a:t>human body using Machine Learning</a:t>
-            </a:r>
+          <a:bodyPr numCol="3">
+            <a:normAutofit lnSpcReduction="10000"/>
+          </a:bodyPr>
+          <a:lstStyle/>
+          <a:p>
+            <a:r>
+              <a:rPr lang="en-IN" b="1" dirty="0"/>
+              <a:t>Sudhanva Narayana</a:t>
+            </a:r>
+          </a:p>
+          <a:p>
+            <a:r>
+              <a:rPr lang="en-IN" sz="2200" i="1" dirty="0"/>
+              <a:t>Machine Learning Intern</a:t>
+            </a:r>
+          </a:p>
+          <a:p>
+            <a:r>
+              <a:rPr lang="en-IN" sz="2200" i="1" dirty="0" err="1"/>
+              <a:t>Faststream</a:t>
+            </a:r>
+            <a:r>
+              <a:rPr lang="en-IN" sz="2200" i="1" dirty="0"/>
+              <a:t> Technologies</a:t>
+            </a:r>
+          </a:p>
+          <a:p>
+            <a:endParaRPr lang="en-IN" dirty="0"/>
+          </a:p>
+          <a:p>
+            <a:r>
+              <a:rPr lang="en-IN" b="1" dirty="0"/>
+              <a:t>Vinay Bansal</a:t>
+            </a:r>
+          </a:p>
+          <a:p>
+            <a:r>
+              <a:rPr lang="en-IN" sz="2200" i="1" dirty="0"/>
+              <a:t>Chief Executive Officer</a:t>
+            </a:r>
+          </a:p>
+          <a:p>
+            <a:r>
+              <a:rPr lang="en-IN" sz="2200" i="1" dirty="0" err="1"/>
+              <a:t>Faststream</a:t>
+            </a:r>
+            <a:r>
+              <a:rPr lang="en-IN" sz="2200" i="1" dirty="0"/>
+              <a:t> Technologies</a:t>
+            </a:r>
+          </a:p>
+          <a:p>
+            <a:endParaRPr lang="en-IN" dirty="0"/>
+          </a:p>
+          <a:p>
+            <a:r>
+              <a:rPr lang="en-IN" b="1" dirty="0"/>
+              <a:t>Vinod Agrawal</a:t>
+            </a:r>
+          </a:p>
+          <a:p>
+            <a:r>
+              <a:rPr lang="en-IN" sz="2200" i="1" dirty="0"/>
+              <a:t>Chief Technology Officer</a:t>
+            </a:r>
+          </a:p>
+          <a:p>
+            <a:r>
+              <a:rPr lang="en-IN" sz="2200" i="1" dirty="0" err="1"/>
+              <a:t>Faststream</a:t>
+            </a:r>
+            <a:r>
+              <a:rPr lang="en-IN" sz="2200" i="1" dirty="0"/>
+              <a:t> Technologies</a:t>
+            </a:r>
+          </a:p>
+          <a:p>
+            <a:endParaRPr lang="en-IN" dirty="0"/>
           </a:p>
         </p:txBody>
       </p:sp>
@@ -4929,956 +5110,12 @@
             <p:ph type="title"/>
           </p:nvPr>
         </p:nvSpPr>
-        <p:spPr/>
-        <p:txBody>
-          <a:bodyPr/>
-          <a:lstStyle/>
-          <a:p>
-            <a:pPr algn="ctr"/>
-            <a:r>
-              <a:rPr lang="en-IN" dirty="0"/>
-              <a:t>Conclusion</a:t>
-            </a:r>
-          </a:p>
-        </p:txBody>
-      </p:sp>
-      <p:sp>
-        <p:nvSpPr>
-          <p:cNvPr id="3" name="Content Placeholder 2">
-            <a:extLst>
-              <a:ext uri="{FF2B5EF4-FFF2-40B4-BE49-F238E27FC236}">
-                <a16:creationId xmlns:a16="http://schemas.microsoft.com/office/drawing/2014/main" id="{8D4F455F-D798-494F-9C24-E9DC82CB8270}"/>
-              </a:ext>
-            </a:extLst>
-          </p:cNvPr>
-          <p:cNvSpPr>
-            <a:spLocks noGrp="1"/>
-          </p:cNvSpPr>
-          <p:nvPr>
-            <p:ph idx="1"/>
-          </p:nvPr>
-        </p:nvSpPr>
-        <p:spPr/>
-        <p:txBody>
-          <a:bodyPr>
-            <a:normAutofit/>
-          </a:bodyPr>
-          <a:lstStyle/>
-          <a:p>
-            <a:r>
-              <a:rPr lang="en-IN" dirty="0"/>
-              <a:t>The performance data is collected based on the confusion matrix produced by the algorithms</a:t>
-            </a:r>
-          </a:p>
-          <a:p>
-            <a:pPr marL="0" indent="0">
-              <a:buNone/>
-            </a:pPr>
-            <a:endParaRPr lang="en-IN" dirty="0"/>
-          </a:p>
-          <a:p>
-            <a:r>
-              <a:rPr lang="en-IN" dirty="0"/>
-              <a:t>Decision Tree and Random Forest classifiers performed better than linear classifiers and topped at almost 99%</a:t>
-            </a:r>
-          </a:p>
-          <a:p>
-            <a:endParaRPr lang="en-IN" dirty="0"/>
-          </a:p>
-          <a:p>
-            <a:r>
-              <a:rPr lang="en-IN" dirty="0"/>
-              <a:t>Similar results can be expected on unseen data.</a:t>
-            </a:r>
-          </a:p>
-        </p:txBody>
-      </p:sp>
-    </p:spTree>
-    <p:extLst>
-      <p:ext uri="{BB962C8B-B14F-4D97-AF65-F5344CB8AC3E}">
-        <p14:creationId xmlns:p14="http://schemas.microsoft.com/office/powerpoint/2010/main" val="1329474444"/>
-      </p:ext>
-    </p:extLst>
-  </p:cSld>
-  <p:clrMapOvr>
-    <a:masterClrMapping/>
-  </p:clrMapOvr>
-</p:sld>
-</file>
-
-<file path=ppt/slides/slide2.xml><?xml version="1.0" encoding="utf-8"?>
-<p:sld xmlns:a="http://schemas.openxmlformats.org/drawingml/2006/main" xmlns:r="http://schemas.openxmlformats.org/officeDocument/2006/relationships" xmlns:p="http://schemas.openxmlformats.org/presentationml/2006/main">
-  <p:cSld>
-    <p:spTree>
-      <p:nvGrpSpPr>
-        <p:cNvPr id="1" name=""/>
-        <p:cNvGrpSpPr/>
-        <p:nvPr/>
-      </p:nvGrpSpPr>
-      <p:grpSpPr>
-        <a:xfrm>
-          <a:off x="0" y="0"/>
-          <a:ext cx="0" cy="0"/>
-          <a:chOff x="0" y="0"/>
-          <a:chExt cx="0" cy="0"/>
-        </a:xfrm>
-      </p:grpSpPr>
-      <p:sp>
-        <p:nvSpPr>
-          <p:cNvPr id="2" name="Title 1">
-            <a:extLst>
-              <a:ext uri="{FF2B5EF4-FFF2-40B4-BE49-F238E27FC236}">
-                <a16:creationId xmlns:a16="http://schemas.microsoft.com/office/drawing/2014/main" id="{46182B09-0B84-49D9-AA53-F59BC31E9C35}"/>
-              </a:ext>
-            </a:extLst>
-          </p:cNvPr>
-          <p:cNvSpPr>
-            <a:spLocks noGrp="1"/>
-          </p:cNvSpPr>
-          <p:nvPr>
-            <p:ph type="title"/>
-          </p:nvPr>
-        </p:nvSpPr>
-        <p:spPr/>
-        <p:txBody>
-          <a:bodyPr/>
-          <a:lstStyle/>
-          <a:p>
-            <a:pPr algn="ctr"/>
-            <a:r>
-              <a:rPr lang="en-IN" dirty="0" err="1"/>
-              <a:t>Idealogy</a:t>
-            </a:r>
-            <a:endParaRPr lang="en-IN" dirty="0"/>
-          </a:p>
-        </p:txBody>
-      </p:sp>
-      <p:sp>
-        <p:nvSpPr>
-          <p:cNvPr id="3" name="Content Placeholder 2">
-            <a:extLst>
-              <a:ext uri="{FF2B5EF4-FFF2-40B4-BE49-F238E27FC236}">
-                <a16:creationId xmlns:a16="http://schemas.microsoft.com/office/drawing/2014/main" id="{8D4F455F-D798-494F-9C24-E9DC82CB8270}"/>
-              </a:ext>
-            </a:extLst>
-          </p:cNvPr>
-          <p:cNvSpPr>
-            <a:spLocks noGrp="1"/>
-          </p:cNvSpPr>
-          <p:nvPr>
-            <p:ph idx="1"/>
-          </p:nvPr>
-        </p:nvSpPr>
-        <p:spPr/>
-        <p:txBody>
-          <a:bodyPr/>
-          <a:lstStyle/>
-          <a:p>
-            <a:r>
-              <a:rPr lang="en-IN" dirty="0"/>
-              <a:t>Human body has electrical properties</a:t>
-            </a:r>
-          </a:p>
-          <a:p>
-            <a:pPr marL="0" indent="0">
-              <a:buNone/>
-            </a:pPr>
-            <a:endParaRPr lang="en-IN" dirty="0"/>
-          </a:p>
-          <a:p>
-            <a:r>
-              <a:rPr lang="en-US" dirty="0"/>
-              <a:t>Surface electrodes are attached to the skin around the body part</a:t>
-            </a:r>
-          </a:p>
-          <a:p>
-            <a:endParaRPr lang="en-US" dirty="0"/>
-          </a:p>
-          <a:p>
-            <a:r>
-              <a:rPr lang="en-US" dirty="0"/>
-              <a:t>Small alternating currents will be applied to the electrodes</a:t>
-            </a:r>
-          </a:p>
-          <a:p>
-            <a:endParaRPr lang="en-US" dirty="0"/>
-          </a:p>
-          <a:p>
-            <a:r>
-              <a:rPr lang="en-IN" dirty="0"/>
-              <a:t>Impedance is measured across electrodes </a:t>
-            </a:r>
-          </a:p>
-        </p:txBody>
-      </p:sp>
-    </p:spTree>
-    <p:extLst>
-      <p:ext uri="{BB962C8B-B14F-4D97-AF65-F5344CB8AC3E}">
-        <p14:creationId xmlns:p14="http://schemas.microsoft.com/office/powerpoint/2010/main" val="1532377955"/>
-      </p:ext>
-    </p:extLst>
-  </p:cSld>
-  <p:clrMapOvr>
-    <a:masterClrMapping/>
-  </p:clrMapOvr>
-</p:sld>
-</file>
-
-<file path=ppt/slides/slide3.xml><?xml version="1.0" encoding="utf-8"?>
-<p:sld xmlns:a="http://schemas.openxmlformats.org/drawingml/2006/main" xmlns:r="http://schemas.openxmlformats.org/officeDocument/2006/relationships" xmlns:p="http://schemas.openxmlformats.org/presentationml/2006/main">
-  <p:cSld>
-    <p:spTree>
-      <p:nvGrpSpPr>
-        <p:cNvPr id="1" name=""/>
-        <p:cNvGrpSpPr/>
-        <p:nvPr/>
-      </p:nvGrpSpPr>
-      <p:grpSpPr>
-        <a:xfrm>
-          <a:off x="0" y="0"/>
-          <a:ext cx="0" cy="0"/>
-          <a:chOff x="0" y="0"/>
-          <a:chExt cx="0" cy="0"/>
-        </a:xfrm>
-      </p:grpSpPr>
-      <p:sp>
-        <p:nvSpPr>
-          <p:cNvPr id="2" name="Title 1">
-            <a:extLst>
-              <a:ext uri="{FF2B5EF4-FFF2-40B4-BE49-F238E27FC236}">
-                <a16:creationId xmlns:a16="http://schemas.microsoft.com/office/drawing/2014/main" id="{74E77574-D26F-4617-A0B9-B7CECC344076}"/>
-              </a:ext>
-            </a:extLst>
-          </p:cNvPr>
-          <p:cNvSpPr>
-            <a:spLocks noGrp="1"/>
-          </p:cNvSpPr>
-          <p:nvPr>
-            <p:ph type="title"/>
-          </p:nvPr>
-        </p:nvSpPr>
-        <p:spPr/>
-        <p:txBody>
-          <a:bodyPr/>
-          <a:lstStyle/>
-          <a:p>
-            <a:pPr algn="ctr"/>
-            <a:r>
-              <a:rPr lang="en-IN" dirty="0"/>
-              <a:t>Sample Image of  an EIT</a:t>
-            </a:r>
-          </a:p>
-        </p:txBody>
-      </p:sp>
-      <p:pic>
-        <p:nvPicPr>
-          <p:cNvPr id="9" name="Content Placeholder 8">
-            <a:extLst>
-              <a:ext uri="{FF2B5EF4-FFF2-40B4-BE49-F238E27FC236}">
-                <a16:creationId xmlns:a16="http://schemas.microsoft.com/office/drawing/2014/main" id="{F08AD92E-C9AE-4177-BEC7-28B9DEC6FD4D}"/>
-              </a:ext>
-            </a:extLst>
-          </p:cNvPr>
-          <p:cNvPicPr>
-            <a:picLocks noGrp="1" noChangeAspect="1"/>
-          </p:cNvPicPr>
-          <p:nvPr>
-            <p:ph idx="1"/>
-          </p:nvPr>
-        </p:nvPicPr>
-        <p:blipFill>
-          <a:blip r:embed="rId2">
-            <a:extLst>
-              <a:ext uri="{28A0092B-C50C-407E-A947-70E740481C1C}">
-                <a14:useLocalDpi xmlns:a14="http://schemas.microsoft.com/office/drawing/2010/main" val="0"/>
-              </a:ext>
-            </a:extLst>
-          </a:blip>
-          <a:stretch>
-            <a:fillRect/>
-          </a:stretch>
-        </p:blipFill>
         <p:spPr>
           <a:xfrm>
-            <a:off x="1793615" y="1879145"/>
-            <a:ext cx="8604769" cy="4083155"/>
+            <a:off x="838200" y="354368"/>
+            <a:ext cx="10515600" cy="1325563"/>
           </a:xfrm>
         </p:spPr>
-      </p:pic>
-    </p:spTree>
-    <p:extLst>
-      <p:ext uri="{BB962C8B-B14F-4D97-AF65-F5344CB8AC3E}">
-        <p14:creationId xmlns:p14="http://schemas.microsoft.com/office/powerpoint/2010/main" val="1968956266"/>
-      </p:ext>
-    </p:extLst>
-  </p:cSld>
-  <p:clrMapOvr>
-    <a:masterClrMapping/>
-  </p:clrMapOvr>
-</p:sld>
-</file>
-
-<file path=ppt/slides/slide4.xml><?xml version="1.0" encoding="utf-8"?>
-<p:sld xmlns:a="http://schemas.openxmlformats.org/drawingml/2006/main" xmlns:r="http://schemas.openxmlformats.org/officeDocument/2006/relationships" xmlns:p="http://schemas.openxmlformats.org/presentationml/2006/main">
-  <p:cSld>
-    <p:spTree>
-      <p:nvGrpSpPr>
-        <p:cNvPr id="1" name=""/>
-        <p:cNvGrpSpPr/>
-        <p:nvPr/>
-      </p:nvGrpSpPr>
-      <p:grpSpPr>
-        <a:xfrm>
-          <a:off x="0" y="0"/>
-          <a:ext cx="0" cy="0"/>
-          <a:chOff x="0" y="0"/>
-          <a:chExt cx="0" cy="0"/>
-        </a:xfrm>
-      </p:grpSpPr>
-      <p:sp>
-        <p:nvSpPr>
-          <p:cNvPr id="2" name="Title 1">
-            <a:extLst>
-              <a:ext uri="{FF2B5EF4-FFF2-40B4-BE49-F238E27FC236}">
-                <a16:creationId xmlns:a16="http://schemas.microsoft.com/office/drawing/2014/main" id="{46182B09-0B84-49D9-AA53-F59BC31E9C35}"/>
-              </a:ext>
-            </a:extLst>
-          </p:cNvPr>
-          <p:cNvSpPr>
-            <a:spLocks noGrp="1"/>
-          </p:cNvSpPr>
-          <p:nvPr>
-            <p:ph type="title"/>
-          </p:nvPr>
-        </p:nvSpPr>
-        <p:spPr/>
-        <p:txBody>
-          <a:bodyPr/>
-          <a:lstStyle/>
-          <a:p>
-            <a:pPr algn="ctr"/>
-            <a:r>
-              <a:rPr lang="en-IN" dirty="0"/>
-              <a:t>Methodology</a:t>
-            </a:r>
-          </a:p>
-        </p:txBody>
-      </p:sp>
-      <p:sp>
-        <p:nvSpPr>
-          <p:cNvPr id="3" name="Content Placeholder 2">
-            <a:extLst>
-              <a:ext uri="{FF2B5EF4-FFF2-40B4-BE49-F238E27FC236}">
-                <a16:creationId xmlns:a16="http://schemas.microsoft.com/office/drawing/2014/main" id="{8D4F455F-D798-494F-9C24-E9DC82CB8270}"/>
-              </a:ext>
-            </a:extLst>
-          </p:cNvPr>
-          <p:cNvSpPr>
-            <a:spLocks noGrp="1"/>
-          </p:cNvSpPr>
-          <p:nvPr>
-            <p:ph idx="1"/>
-          </p:nvPr>
-        </p:nvSpPr>
-        <p:spPr/>
-        <p:txBody>
-          <a:bodyPr>
-            <a:normAutofit/>
-          </a:bodyPr>
-          <a:lstStyle/>
-          <a:p>
-            <a:r>
-              <a:rPr lang="en-IN" dirty="0"/>
-              <a:t>Sample image is imported using OpenCV and is converted into a 2D Matrix</a:t>
-            </a:r>
-          </a:p>
-          <a:p>
-            <a:endParaRPr lang="en-IN" dirty="0"/>
-          </a:p>
-          <a:p>
-            <a:r>
-              <a:rPr lang="en-IN" dirty="0"/>
-              <a:t>To simplify the process, it is converted to grayscale</a:t>
-            </a:r>
-          </a:p>
-          <a:p>
-            <a:pPr marL="0" indent="0">
-              <a:buNone/>
-            </a:pPr>
-            <a:endParaRPr lang="en-IN" dirty="0"/>
-          </a:p>
-          <a:p>
-            <a:r>
-              <a:rPr lang="en-US" dirty="0"/>
-              <a:t>Each value in the matrix represents intensities of either black or white (0 being black and 1 being white)</a:t>
-            </a:r>
-          </a:p>
-          <a:p>
-            <a:endParaRPr lang="en-US" dirty="0"/>
-          </a:p>
-          <a:p>
-            <a:r>
-              <a:rPr lang="en-IN" dirty="0"/>
-              <a:t>Impedance is measured across electrodes </a:t>
-            </a:r>
-          </a:p>
-        </p:txBody>
-      </p:sp>
-    </p:spTree>
-    <p:extLst>
-      <p:ext uri="{BB962C8B-B14F-4D97-AF65-F5344CB8AC3E}">
-        <p14:creationId xmlns:p14="http://schemas.microsoft.com/office/powerpoint/2010/main" val="3526956426"/>
-      </p:ext>
-    </p:extLst>
-  </p:cSld>
-  <p:clrMapOvr>
-    <a:masterClrMapping/>
-  </p:clrMapOvr>
-</p:sld>
-</file>
-
-<file path=ppt/slides/slide5.xml><?xml version="1.0" encoding="utf-8"?>
-<p:sld xmlns:a="http://schemas.openxmlformats.org/drawingml/2006/main" xmlns:r="http://schemas.openxmlformats.org/officeDocument/2006/relationships" xmlns:p="http://schemas.openxmlformats.org/presentationml/2006/main">
-  <p:cSld>
-    <p:spTree>
-      <p:nvGrpSpPr>
-        <p:cNvPr id="1" name=""/>
-        <p:cNvGrpSpPr/>
-        <p:nvPr/>
-      </p:nvGrpSpPr>
-      <p:grpSpPr>
-        <a:xfrm>
-          <a:off x="0" y="0"/>
-          <a:ext cx="0" cy="0"/>
-          <a:chOff x="0" y="0"/>
-          <a:chExt cx="0" cy="0"/>
-        </a:xfrm>
-      </p:grpSpPr>
-      <p:sp>
-        <p:nvSpPr>
-          <p:cNvPr id="2" name="Title 1">
-            <a:extLst>
-              <a:ext uri="{FF2B5EF4-FFF2-40B4-BE49-F238E27FC236}">
-                <a16:creationId xmlns:a16="http://schemas.microsoft.com/office/drawing/2014/main" id="{1DF9B4CF-F41F-4EC3-8B7D-C3DBD3A41EA8}"/>
-              </a:ext>
-            </a:extLst>
-          </p:cNvPr>
-          <p:cNvSpPr>
-            <a:spLocks noGrp="1"/>
-          </p:cNvSpPr>
-          <p:nvPr>
-            <p:ph type="title"/>
-          </p:nvPr>
-        </p:nvSpPr>
-        <p:spPr/>
-        <p:txBody>
-          <a:bodyPr/>
-          <a:lstStyle/>
-          <a:p>
-            <a:pPr algn="ctr"/>
-            <a:r>
-              <a:rPr lang="en-IN" dirty="0"/>
-              <a:t>Image generation</a:t>
-            </a:r>
-          </a:p>
-        </p:txBody>
-      </p:sp>
-      <p:sp>
-        <p:nvSpPr>
-          <p:cNvPr id="3" name="Content Placeholder 2">
-            <a:extLst>
-              <a:ext uri="{FF2B5EF4-FFF2-40B4-BE49-F238E27FC236}">
-                <a16:creationId xmlns:a16="http://schemas.microsoft.com/office/drawing/2014/main" id="{1DC37106-73DB-45AF-A869-7415D744EAD5}"/>
-              </a:ext>
-            </a:extLst>
-          </p:cNvPr>
-          <p:cNvSpPr>
-            <a:spLocks noGrp="1"/>
-          </p:cNvSpPr>
-          <p:nvPr>
-            <p:ph idx="1"/>
-          </p:nvPr>
-        </p:nvSpPr>
-        <p:spPr/>
-        <p:txBody>
-          <a:bodyPr>
-            <a:normAutofit/>
-          </a:bodyPr>
-          <a:lstStyle/>
-          <a:p>
-            <a:r>
-              <a:rPr lang="en-IN" dirty="0"/>
-              <a:t>numpy – random number generator, </a:t>
-            </a:r>
-            <a:r>
-              <a:rPr lang="en-IN" dirty="0" err="1"/>
-              <a:t>linspace</a:t>
-            </a:r>
-            <a:r>
-              <a:rPr lang="en-IN" dirty="0"/>
-              <a:t> and </a:t>
-            </a:r>
-            <a:r>
-              <a:rPr lang="en-IN" dirty="0" err="1"/>
-              <a:t>meshgrid</a:t>
-            </a:r>
-            <a:endParaRPr lang="en-IN" dirty="0"/>
-          </a:p>
-          <a:p>
-            <a:endParaRPr lang="en-IN" dirty="0"/>
-          </a:p>
-          <a:p>
-            <a:r>
-              <a:rPr lang="en-IN" dirty="0"/>
-              <a:t>1000 random-related images are created based on the matrices and its values</a:t>
-            </a:r>
-          </a:p>
-          <a:p>
-            <a:endParaRPr lang="en-IN" dirty="0"/>
-          </a:p>
-          <a:p>
-            <a:r>
-              <a:rPr lang="en-IN" dirty="0"/>
-              <a:t>The generated images are read back into code</a:t>
-            </a:r>
-          </a:p>
-          <a:p>
-            <a:endParaRPr lang="en-IN" dirty="0"/>
-          </a:p>
-          <a:p>
-            <a:r>
-              <a:rPr lang="en-IN" dirty="0"/>
-              <a:t>Images are plotted to observe the distribution of intensities</a:t>
-            </a:r>
-          </a:p>
-        </p:txBody>
-      </p:sp>
-    </p:spTree>
-    <p:extLst>
-      <p:ext uri="{BB962C8B-B14F-4D97-AF65-F5344CB8AC3E}">
-        <p14:creationId xmlns:p14="http://schemas.microsoft.com/office/powerpoint/2010/main" val="1555146656"/>
-      </p:ext>
-    </p:extLst>
-  </p:cSld>
-  <p:clrMapOvr>
-    <a:masterClrMapping/>
-  </p:clrMapOvr>
-</p:sld>
-</file>
-
-<file path=ppt/slides/slide6.xml><?xml version="1.0" encoding="utf-8"?>
-<p:sld xmlns:a="http://schemas.openxmlformats.org/drawingml/2006/main" xmlns:r="http://schemas.openxmlformats.org/officeDocument/2006/relationships" xmlns:p="http://schemas.openxmlformats.org/presentationml/2006/main">
-  <p:cSld>
-    <p:spTree>
-      <p:nvGrpSpPr>
-        <p:cNvPr id="1" name=""/>
-        <p:cNvGrpSpPr/>
-        <p:nvPr/>
-      </p:nvGrpSpPr>
-      <p:grpSpPr>
-        <a:xfrm>
-          <a:off x="0" y="0"/>
-          <a:ext cx="0" cy="0"/>
-          <a:chOff x="0" y="0"/>
-          <a:chExt cx="0" cy="0"/>
-        </a:xfrm>
-      </p:grpSpPr>
-      <p:sp>
-        <p:nvSpPr>
-          <p:cNvPr id="2" name="Title 1">
-            <a:extLst>
-              <a:ext uri="{FF2B5EF4-FFF2-40B4-BE49-F238E27FC236}">
-                <a16:creationId xmlns:a16="http://schemas.microsoft.com/office/drawing/2014/main" id="{6E34496D-787C-464D-9CBC-D872C3C54BF5}"/>
-              </a:ext>
-            </a:extLst>
-          </p:cNvPr>
-          <p:cNvSpPr>
-            <a:spLocks noGrp="1"/>
-          </p:cNvSpPr>
-          <p:nvPr>
-            <p:ph type="title"/>
-          </p:nvPr>
-        </p:nvSpPr>
-        <p:spPr/>
-        <p:txBody>
-          <a:bodyPr/>
-          <a:lstStyle/>
-          <a:p>
-            <a:pPr algn="ctr"/>
-            <a:r>
-              <a:rPr lang="en-IN" dirty="0"/>
-              <a:t>Sample Image Generated</a:t>
-            </a:r>
-          </a:p>
-        </p:txBody>
-      </p:sp>
-      <p:pic>
-        <p:nvPicPr>
-          <p:cNvPr id="7" name="Content Placeholder 6">
-            <a:extLst>
-              <a:ext uri="{FF2B5EF4-FFF2-40B4-BE49-F238E27FC236}">
-                <a16:creationId xmlns:a16="http://schemas.microsoft.com/office/drawing/2014/main" id="{BEBB1E4C-3979-48FB-8276-33AC6FF9FA19}"/>
-              </a:ext>
-            </a:extLst>
-          </p:cNvPr>
-          <p:cNvPicPr>
-            <a:picLocks noGrp="1" noChangeAspect="1"/>
-          </p:cNvPicPr>
-          <p:nvPr>
-            <p:ph sz="half" idx="1"/>
-          </p:nvPr>
-        </p:nvPicPr>
-        <p:blipFill>
-          <a:blip r:embed="rId3">
-            <a:extLst>
-              <a:ext uri="{28A0092B-C50C-407E-A947-70E740481C1C}">
-                <a14:useLocalDpi xmlns:a14="http://schemas.microsoft.com/office/drawing/2010/main" val="0"/>
-              </a:ext>
-            </a:extLst>
-          </a:blip>
-          <a:stretch>
-            <a:fillRect/>
-          </a:stretch>
-        </p:blipFill>
-        <p:spPr>
-          <a:xfrm>
-            <a:off x="634979" y="1754158"/>
-            <a:ext cx="5784481" cy="4494271"/>
-          </a:xfrm>
-        </p:spPr>
-      </p:pic>
-      <p:sp>
-        <p:nvSpPr>
-          <p:cNvPr id="5" name="Content Placeholder 4">
-            <a:extLst>
-              <a:ext uri="{FF2B5EF4-FFF2-40B4-BE49-F238E27FC236}">
-                <a16:creationId xmlns:a16="http://schemas.microsoft.com/office/drawing/2014/main" id="{3EF0BC74-48E3-4A75-A49D-C582CBBC47BB}"/>
-              </a:ext>
-            </a:extLst>
-          </p:cNvPr>
-          <p:cNvSpPr>
-            <a:spLocks noGrp="1"/>
-          </p:cNvSpPr>
-          <p:nvPr>
-            <p:ph sz="half" idx="2"/>
-          </p:nvPr>
-        </p:nvSpPr>
-        <p:spPr/>
-        <p:txBody>
-          <a:bodyPr/>
-          <a:lstStyle/>
-          <a:p>
-            <a:r>
-              <a:rPr lang="en-IN" dirty="0"/>
-              <a:t>The range of values are assigned colours only for the purpose of representation</a:t>
-            </a:r>
-          </a:p>
-          <a:p>
-            <a:endParaRPr lang="en-IN" dirty="0"/>
-          </a:p>
-          <a:p>
-            <a:r>
-              <a:rPr lang="en-IN" dirty="0"/>
-              <a:t>Originally, the image is still grayscale</a:t>
-            </a:r>
-          </a:p>
-          <a:p>
-            <a:endParaRPr lang="en-IN" dirty="0"/>
-          </a:p>
-          <a:p>
-            <a:r>
-              <a:rPr lang="en-IN" dirty="0"/>
-              <a:t>The red region is considered affected</a:t>
-            </a:r>
-          </a:p>
-        </p:txBody>
-      </p:sp>
-    </p:spTree>
-    <p:extLst>
-      <p:ext uri="{BB962C8B-B14F-4D97-AF65-F5344CB8AC3E}">
-        <p14:creationId xmlns:p14="http://schemas.microsoft.com/office/powerpoint/2010/main" val="2759289731"/>
-      </p:ext>
-    </p:extLst>
-  </p:cSld>
-  <p:clrMapOvr>
-    <a:masterClrMapping/>
-  </p:clrMapOvr>
-</p:sld>
-</file>
-
-<file path=ppt/slides/slide7.xml><?xml version="1.0" encoding="utf-8"?>
-<p:sld xmlns:a="http://schemas.openxmlformats.org/drawingml/2006/main" xmlns:r="http://schemas.openxmlformats.org/officeDocument/2006/relationships" xmlns:p="http://schemas.openxmlformats.org/presentationml/2006/main">
-  <p:cSld>
-    <p:spTree>
-      <p:nvGrpSpPr>
-        <p:cNvPr id="1" name=""/>
-        <p:cNvGrpSpPr/>
-        <p:nvPr/>
-      </p:nvGrpSpPr>
-      <p:grpSpPr>
-        <a:xfrm>
-          <a:off x="0" y="0"/>
-          <a:ext cx="0" cy="0"/>
-          <a:chOff x="0" y="0"/>
-          <a:chExt cx="0" cy="0"/>
-        </a:xfrm>
-      </p:grpSpPr>
-      <p:sp>
-        <p:nvSpPr>
-          <p:cNvPr id="2" name="Title 1">
-            <a:extLst>
-              <a:ext uri="{FF2B5EF4-FFF2-40B4-BE49-F238E27FC236}">
-                <a16:creationId xmlns:a16="http://schemas.microsoft.com/office/drawing/2014/main" id="{1DF9B4CF-F41F-4EC3-8B7D-C3DBD3A41EA8}"/>
-              </a:ext>
-            </a:extLst>
-          </p:cNvPr>
-          <p:cNvSpPr>
-            <a:spLocks noGrp="1"/>
-          </p:cNvSpPr>
-          <p:nvPr>
-            <p:ph type="title"/>
-          </p:nvPr>
-        </p:nvSpPr>
-        <p:spPr/>
-        <p:txBody>
-          <a:bodyPr/>
-          <a:lstStyle/>
-          <a:p>
-            <a:pPr algn="ctr"/>
-            <a:r>
-              <a:rPr lang="en-IN" dirty="0"/>
-              <a:t>Image generation - Target</a:t>
-            </a:r>
-          </a:p>
-        </p:txBody>
-      </p:sp>
-      <p:sp>
-        <p:nvSpPr>
-          <p:cNvPr id="3" name="Content Placeholder 2">
-            <a:extLst>
-              <a:ext uri="{FF2B5EF4-FFF2-40B4-BE49-F238E27FC236}">
-                <a16:creationId xmlns:a16="http://schemas.microsoft.com/office/drawing/2014/main" id="{1DC37106-73DB-45AF-A869-7415D744EAD5}"/>
-              </a:ext>
-            </a:extLst>
-          </p:cNvPr>
-          <p:cNvSpPr>
-            <a:spLocks noGrp="1"/>
-          </p:cNvSpPr>
-          <p:nvPr>
-            <p:ph idx="1"/>
-          </p:nvPr>
-        </p:nvSpPr>
-        <p:spPr/>
-        <p:txBody>
-          <a:bodyPr>
-            <a:normAutofit fontScale="85000" lnSpcReduction="10000"/>
-          </a:bodyPr>
-          <a:lstStyle/>
-          <a:p>
-            <a:r>
-              <a:rPr lang="en-IN" dirty="0"/>
-              <a:t>Mean intensity ranges are calculated and are assigned labels (colours) correspondingly</a:t>
-            </a:r>
-          </a:p>
-          <a:p>
-            <a:pPr marL="0" indent="0">
-              <a:buNone/>
-            </a:pPr>
-            <a:endParaRPr lang="en-IN" dirty="0"/>
-          </a:p>
-          <a:p>
-            <a:r>
-              <a:rPr lang="en-IN" dirty="0"/>
-              <a:t>A dataset of 8 intensity ranges (columns) and 1000 values (rows) are created</a:t>
-            </a:r>
-          </a:p>
-          <a:p>
-            <a:endParaRPr lang="en-IN" dirty="0"/>
-          </a:p>
-          <a:p>
-            <a:r>
-              <a:rPr lang="en-IN" dirty="0"/>
-              <a:t>Binary targets are generated and are appended to the existing dataset as a target column</a:t>
-            </a:r>
-          </a:p>
-          <a:p>
-            <a:endParaRPr lang="en-IN" dirty="0"/>
-          </a:p>
-          <a:p>
-            <a:r>
-              <a:rPr lang="en-IN" dirty="0"/>
-              <a:t>If the pixel count is more than the mean, the image is categorised as ‘1’</a:t>
-            </a:r>
-          </a:p>
-          <a:p>
-            <a:endParaRPr lang="en-IN" dirty="0"/>
-          </a:p>
-          <a:p>
-            <a:r>
-              <a:rPr lang="en-IN" dirty="0"/>
-              <a:t>If the pixel count is less than the mean, the image is categorised as ‘0’</a:t>
-            </a:r>
-          </a:p>
-        </p:txBody>
-      </p:sp>
-    </p:spTree>
-    <p:extLst>
-      <p:ext uri="{BB962C8B-B14F-4D97-AF65-F5344CB8AC3E}">
-        <p14:creationId xmlns:p14="http://schemas.microsoft.com/office/powerpoint/2010/main" val="2545900518"/>
-      </p:ext>
-    </p:extLst>
-  </p:cSld>
-  <p:clrMapOvr>
-    <a:masterClrMapping/>
-  </p:clrMapOvr>
-</p:sld>
-</file>
-
-<file path=ppt/slides/slide8.xml><?xml version="1.0" encoding="utf-8"?>
-<p:sld xmlns:a="http://schemas.openxmlformats.org/drawingml/2006/main" xmlns:r="http://schemas.openxmlformats.org/officeDocument/2006/relationships" xmlns:p="http://schemas.openxmlformats.org/presentationml/2006/main">
-  <p:cSld>
-    <p:spTree>
-      <p:nvGrpSpPr>
-        <p:cNvPr id="1" name=""/>
-        <p:cNvGrpSpPr/>
-        <p:nvPr/>
-      </p:nvGrpSpPr>
-      <p:grpSpPr>
-        <a:xfrm>
-          <a:off x="0" y="0"/>
-          <a:ext cx="0" cy="0"/>
-          <a:chOff x="0" y="0"/>
-          <a:chExt cx="0" cy="0"/>
-        </a:xfrm>
-      </p:grpSpPr>
-      <p:sp>
-        <p:nvSpPr>
-          <p:cNvPr id="2" name="Title 1">
-            <a:extLst>
-              <a:ext uri="{FF2B5EF4-FFF2-40B4-BE49-F238E27FC236}">
-                <a16:creationId xmlns:a16="http://schemas.microsoft.com/office/drawing/2014/main" id="{46182B09-0B84-49D9-AA53-F59BC31E9C35}"/>
-              </a:ext>
-            </a:extLst>
-          </p:cNvPr>
-          <p:cNvSpPr>
-            <a:spLocks noGrp="1"/>
-          </p:cNvSpPr>
-          <p:nvPr>
-            <p:ph type="title"/>
-          </p:nvPr>
-        </p:nvSpPr>
-        <p:spPr/>
-        <p:txBody>
-          <a:bodyPr/>
-          <a:lstStyle/>
-          <a:p>
-            <a:pPr algn="ctr"/>
-            <a:r>
-              <a:rPr lang="en-IN" dirty="0"/>
-              <a:t>Machine Learning</a:t>
-            </a:r>
-          </a:p>
-        </p:txBody>
-      </p:sp>
-      <p:sp>
-        <p:nvSpPr>
-          <p:cNvPr id="3" name="Content Placeholder 2">
-            <a:extLst>
-              <a:ext uri="{FF2B5EF4-FFF2-40B4-BE49-F238E27FC236}">
-                <a16:creationId xmlns:a16="http://schemas.microsoft.com/office/drawing/2014/main" id="{8D4F455F-D798-494F-9C24-E9DC82CB8270}"/>
-              </a:ext>
-            </a:extLst>
-          </p:cNvPr>
-          <p:cNvSpPr>
-            <a:spLocks noGrp="1"/>
-          </p:cNvSpPr>
-          <p:nvPr>
-            <p:ph idx="1"/>
-          </p:nvPr>
-        </p:nvSpPr>
-        <p:spPr/>
-        <p:txBody>
-          <a:bodyPr>
-            <a:normAutofit/>
-          </a:bodyPr>
-          <a:lstStyle/>
-          <a:p>
-            <a:r>
-              <a:rPr lang="en-IN" dirty="0"/>
-              <a:t>Data attributes with pixel counts greater than zero are selected as features </a:t>
-            </a:r>
-          </a:p>
-          <a:p>
-            <a:endParaRPr lang="en-IN" dirty="0"/>
-          </a:p>
-          <a:p>
-            <a:r>
-              <a:rPr lang="en-IN" dirty="0"/>
-              <a:t>Data is split into training and test sets and the </a:t>
-            </a:r>
-            <a:r>
-              <a:rPr lang="en-US" dirty="0"/>
-              <a:t>model is trained on the training set</a:t>
-            </a:r>
-          </a:p>
-          <a:p>
-            <a:endParaRPr lang="en-US" dirty="0"/>
-          </a:p>
-          <a:p>
-            <a:r>
-              <a:rPr lang="en-IN" dirty="0"/>
-              <a:t>Performance of various classification algorithms are measured using cross-validation</a:t>
-            </a:r>
-          </a:p>
-        </p:txBody>
-      </p:sp>
-    </p:spTree>
-    <p:extLst>
-      <p:ext uri="{BB962C8B-B14F-4D97-AF65-F5344CB8AC3E}">
-        <p14:creationId xmlns:p14="http://schemas.microsoft.com/office/powerpoint/2010/main" val="1148527351"/>
-      </p:ext>
-    </p:extLst>
-  </p:cSld>
-  <p:clrMapOvr>
-    <a:masterClrMapping/>
-  </p:clrMapOvr>
-</p:sld>
-</file>
-
-<file path=ppt/slides/slide9.xml><?xml version="1.0" encoding="utf-8"?>
-<p:sld xmlns:a="http://schemas.openxmlformats.org/drawingml/2006/main" xmlns:r="http://schemas.openxmlformats.org/officeDocument/2006/relationships" xmlns:p="http://schemas.openxmlformats.org/presentationml/2006/main">
-  <p:cSld>
-    <p:spTree>
-      <p:nvGrpSpPr>
-        <p:cNvPr id="1" name=""/>
-        <p:cNvGrpSpPr/>
-        <p:nvPr/>
-      </p:nvGrpSpPr>
-      <p:grpSpPr>
-        <a:xfrm>
-          <a:off x="0" y="0"/>
-          <a:ext cx="0" cy="0"/>
-          <a:chOff x="0" y="0"/>
-          <a:chExt cx="0" cy="0"/>
-        </a:xfrm>
-      </p:grpSpPr>
-      <p:sp>
-        <p:nvSpPr>
-          <p:cNvPr id="2" name="Title 1">
-            <a:extLst>
-              <a:ext uri="{FF2B5EF4-FFF2-40B4-BE49-F238E27FC236}">
-                <a16:creationId xmlns:a16="http://schemas.microsoft.com/office/drawing/2014/main" id="{46182B09-0B84-49D9-AA53-F59BC31E9C35}"/>
-              </a:ext>
-            </a:extLst>
-          </p:cNvPr>
-          <p:cNvSpPr>
-            <a:spLocks noGrp="1"/>
-          </p:cNvSpPr>
-          <p:nvPr>
-            <p:ph type="title"/>
-          </p:nvPr>
-        </p:nvSpPr>
-        <p:spPr/>
         <p:txBody>
           <a:bodyPr/>
           <a:lstStyle/>
@@ -6298,12 +5535,12 @@
                         </a:spcAft>
                       </a:pPr>
                       <a:r>
-                        <a:rPr lang="en-IN" sz="1800">
+                        <a:rPr lang="en-IN" sz="1800" dirty="0">
                           <a:effectLst/>
                         </a:rPr>
                         <a:t>98.8%</a:t>
                       </a:r>
-                      <a:endParaRPr lang="en-IN" sz="1800">
+                      <a:endParaRPr lang="en-IN" sz="1800" dirty="0">
                         <a:effectLst/>
                         <a:latin typeface="Calibri" panose="020F0502020204030204" pitchFamily="34" charset="0"/>
                         <a:ea typeface="Calibri" panose="020F0502020204030204" pitchFamily="34" charset="0"/>
@@ -6797,6 +6034,1073 @@
     <p:extLst>
       <p:ext uri="{BB962C8B-B14F-4D97-AF65-F5344CB8AC3E}">
         <p14:creationId xmlns:p14="http://schemas.microsoft.com/office/powerpoint/2010/main" val="305863307"/>
+      </p:ext>
+    </p:extLst>
+  </p:cSld>
+  <p:clrMapOvr>
+    <a:masterClrMapping/>
+  </p:clrMapOvr>
+</p:sld>
+</file>
+
+<file path=ppt/slides/slide11.xml><?xml version="1.0" encoding="utf-8"?>
+<p:sld xmlns:a="http://schemas.openxmlformats.org/drawingml/2006/main" xmlns:r="http://schemas.openxmlformats.org/officeDocument/2006/relationships" xmlns:p="http://schemas.openxmlformats.org/presentationml/2006/main">
+  <p:cSld>
+    <p:spTree>
+      <p:nvGrpSpPr>
+        <p:cNvPr id="1" name=""/>
+        <p:cNvGrpSpPr/>
+        <p:nvPr/>
+      </p:nvGrpSpPr>
+      <p:grpSpPr>
+        <a:xfrm>
+          <a:off x="0" y="0"/>
+          <a:ext cx="0" cy="0"/>
+          <a:chOff x="0" y="0"/>
+          <a:chExt cx="0" cy="0"/>
+        </a:xfrm>
+      </p:grpSpPr>
+      <p:sp>
+        <p:nvSpPr>
+          <p:cNvPr id="2" name="Title 1">
+            <a:extLst>
+              <a:ext uri="{FF2B5EF4-FFF2-40B4-BE49-F238E27FC236}">
+                <a16:creationId xmlns:a16="http://schemas.microsoft.com/office/drawing/2014/main" id="{46182B09-0B84-49D9-AA53-F59BC31E9C35}"/>
+              </a:ext>
+            </a:extLst>
+          </p:cNvPr>
+          <p:cNvSpPr>
+            <a:spLocks noGrp="1"/>
+          </p:cNvSpPr>
+          <p:nvPr>
+            <p:ph type="title"/>
+          </p:nvPr>
+        </p:nvSpPr>
+        <p:spPr/>
+        <p:txBody>
+          <a:bodyPr/>
+          <a:lstStyle/>
+          <a:p>
+            <a:pPr algn="ctr"/>
+            <a:r>
+              <a:rPr lang="en-IN" dirty="0"/>
+              <a:t>Conclusion</a:t>
+            </a:r>
+          </a:p>
+        </p:txBody>
+      </p:sp>
+      <p:sp>
+        <p:nvSpPr>
+          <p:cNvPr id="3" name="Content Placeholder 2">
+            <a:extLst>
+              <a:ext uri="{FF2B5EF4-FFF2-40B4-BE49-F238E27FC236}">
+                <a16:creationId xmlns:a16="http://schemas.microsoft.com/office/drawing/2014/main" id="{8D4F455F-D798-494F-9C24-E9DC82CB8270}"/>
+              </a:ext>
+            </a:extLst>
+          </p:cNvPr>
+          <p:cNvSpPr>
+            <a:spLocks noGrp="1"/>
+          </p:cNvSpPr>
+          <p:nvPr>
+            <p:ph idx="1"/>
+          </p:nvPr>
+        </p:nvSpPr>
+        <p:spPr/>
+        <p:txBody>
+          <a:bodyPr>
+            <a:normAutofit/>
+          </a:bodyPr>
+          <a:lstStyle/>
+          <a:p>
+            <a:r>
+              <a:rPr lang="en-IN" dirty="0"/>
+              <a:t>The performance data is collected based on the confusion matrix produced by the algorithms</a:t>
+            </a:r>
+          </a:p>
+          <a:p>
+            <a:pPr marL="0" indent="0">
+              <a:buNone/>
+            </a:pPr>
+            <a:endParaRPr lang="en-IN" dirty="0"/>
+          </a:p>
+          <a:p>
+            <a:r>
+              <a:rPr lang="en-IN" dirty="0"/>
+              <a:t>Decision Tree and Random Forest classifiers performed better than linear classifiers and topped at almost 99%</a:t>
+            </a:r>
+          </a:p>
+          <a:p>
+            <a:endParaRPr lang="en-IN" dirty="0"/>
+          </a:p>
+          <a:p>
+            <a:r>
+              <a:rPr lang="en-IN" dirty="0"/>
+              <a:t>Similar results can be expected on unseen data.</a:t>
+            </a:r>
+          </a:p>
+        </p:txBody>
+      </p:sp>
+    </p:spTree>
+    <p:extLst>
+      <p:ext uri="{BB962C8B-B14F-4D97-AF65-F5344CB8AC3E}">
+        <p14:creationId xmlns:p14="http://schemas.microsoft.com/office/powerpoint/2010/main" val="1329474444"/>
+      </p:ext>
+    </p:extLst>
+  </p:cSld>
+  <p:clrMapOvr>
+    <a:masterClrMapping/>
+  </p:clrMapOvr>
+</p:sld>
+</file>
+
+<file path=ppt/slides/slide2.xml><?xml version="1.0" encoding="utf-8"?>
+<p:sld xmlns:a="http://schemas.openxmlformats.org/drawingml/2006/main" xmlns:r="http://schemas.openxmlformats.org/officeDocument/2006/relationships" xmlns:p="http://schemas.openxmlformats.org/presentationml/2006/main">
+  <p:cSld>
+    <p:spTree>
+      <p:nvGrpSpPr>
+        <p:cNvPr id="1" name=""/>
+        <p:cNvGrpSpPr/>
+        <p:nvPr/>
+      </p:nvGrpSpPr>
+      <p:grpSpPr>
+        <a:xfrm>
+          <a:off x="0" y="0"/>
+          <a:ext cx="0" cy="0"/>
+          <a:chOff x="0" y="0"/>
+          <a:chExt cx="0" cy="0"/>
+        </a:xfrm>
+      </p:grpSpPr>
+      <p:sp>
+        <p:nvSpPr>
+          <p:cNvPr id="2" name="Title 1">
+            <a:extLst>
+              <a:ext uri="{FF2B5EF4-FFF2-40B4-BE49-F238E27FC236}">
+                <a16:creationId xmlns:a16="http://schemas.microsoft.com/office/drawing/2014/main" id="{46182B09-0B84-49D9-AA53-F59BC31E9C35}"/>
+              </a:ext>
+            </a:extLst>
+          </p:cNvPr>
+          <p:cNvSpPr>
+            <a:spLocks noGrp="1"/>
+          </p:cNvSpPr>
+          <p:nvPr>
+            <p:ph type="title"/>
+          </p:nvPr>
+        </p:nvSpPr>
+        <p:spPr/>
+        <p:txBody>
+          <a:bodyPr/>
+          <a:lstStyle/>
+          <a:p>
+            <a:pPr algn="ctr"/>
+            <a:r>
+              <a:rPr lang="en-IN" dirty="0"/>
+              <a:t>Objective</a:t>
+            </a:r>
+          </a:p>
+        </p:txBody>
+      </p:sp>
+      <p:sp>
+        <p:nvSpPr>
+          <p:cNvPr id="3" name="Content Placeholder 2">
+            <a:extLst>
+              <a:ext uri="{FF2B5EF4-FFF2-40B4-BE49-F238E27FC236}">
+                <a16:creationId xmlns:a16="http://schemas.microsoft.com/office/drawing/2014/main" id="{8D4F455F-D798-494F-9C24-E9DC82CB8270}"/>
+              </a:ext>
+            </a:extLst>
+          </p:cNvPr>
+          <p:cNvSpPr>
+            <a:spLocks noGrp="1"/>
+          </p:cNvSpPr>
+          <p:nvPr>
+            <p:ph idx="1"/>
+          </p:nvPr>
+        </p:nvSpPr>
+        <p:spPr/>
+        <p:txBody>
+          <a:bodyPr/>
+          <a:lstStyle/>
+          <a:p>
+            <a:r>
+              <a:rPr lang="en-IN" dirty="0"/>
+              <a:t>To classify Electrical Impedance Tomography images </a:t>
+            </a:r>
+          </a:p>
+          <a:p>
+            <a:pPr marL="0" indent="0">
+              <a:buNone/>
+            </a:pPr>
+            <a:endParaRPr lang="en-IN" dirty="0"/>
+          </a:p>
+          <a:p>
+            <a:r>
+              <a:rPr lang="en-US" dirty="0"/>
+              <a:t>Images with higher intensities are classified as affected images</a:t>
+            </a:r>
+          </a:p>
+          <a:p>
+            <a:endParaRPr lang="en-US" dirty="0"/>
+          </a:p>
+          <a:p>
+            <a:r>
+              <a:rPr lang="en-US" dirty="0"/>
+              <a:t>Images with lower intensities are classified as non-affected images</a:t>
+            </a:r>
+          </a:p>
+          <a:p>
+            <a:endParaRPr lang="en-US" dirty="0"/>
+          </a:p>
+          <a:p>
+            <a:r>
+              <a:rPr lang="en-IN" dirty="0"/>
+              <a:t>Performance of various Machine Learning algorithms on these images are measured</a:t>
+            </a:r>
+          </a:p>
+        </p:txBody>
+      </p:sp>
+    </p:spTree>
+    <p:extLst>
+      <p:ext uri="{BB962C8B-B14F-4D97-AF65-F5344CB8AC3E}">
+        <p14:creationId xmlns:p14="http://schemas.microsoft.com/office/powerpoint/2010/main" val="1532377955"/>
+      </p:ext>
+    </p:extLst>
+  </p:cSld>
+  <p:clrMapOvr>
+    <a:masterClrMapping/>
+  </p:clrMapOvr>
+</p:sld>
+</file>
+
+<file path=ppt/slides/slide3.xml><?xml version="1.0" encoding="utf-8"?>
+<p:sld xmlns:a="http://schemas.openxmlformats.org/drawingml/2006/main" xmlns:r="http://schemas.openxmlformats.org/officeDocument/2006/relationships" xmlns:p="http://schemas.openxmlformats.org/presentationml/2006/main">
+  <p:cSld>
+    <p:spTree>
+      <p:nvGrpSpPr>
+        <p:cNvPr id="1" name=""/>
+        <p:cNvGrpSpPr/>
+        <p:nvPr/>
+      </p:nvGrpSpPr>
+      <p:grpSpPr>
+        <a:xfrm>
+          <a:off x="0" y="0"/>
+          <a:ext cx="0" cy="0"/>
+          <a:chOff x="0" y="0"/>
+          <a:chExt cx="0" cy="0"/>
+        </a:xfrm>
+      </p:grpSpPr>
+      <p:sp>
+        <p:nvSpPr>
+          <p:cNvPr id="2" name="Title 1">
+            <a:extLst>
+              <a:ext uri="{FF2B5EF4-FFF2-40B4-BE49-F238E27FC236}">
+                <a16:creationId xmlns:a16="http://schemas.microsoft.com/office/drawing/2014/main" id="{74E77574-D26F-4617-A0B9-B7CECC344076}"/>
+              </a:ext>
+            </a:extLst>
+          </p:cNvPr>
+          <p:cNvSpPr>
+            <a:spLocks noGrp="1"/>
+          </p:cNvSpPr>
+          <p:nvPr>
+            <p:ph type="title"/>
+          </p:nvPr>
+        </p:nvSpPr>
+        <p:spPr/>
+        <p:txBody>
+          <a:bodyPr/>
+          <a:lstStyle/>
+          <a:p>
+            <a:pPr algn="ctr"/>
+            <a:r>
+              <a:rPr lang="en-IN" dirty="0"/>
+              <a:t>Sample Image of  an EIT</a:t>
+            </a:r>
+          </a:p>
+        </p:txBody>
+      </p:sp>
+      <p:pic>
+        <p:nvPicPr>
+          <p:cNvPr id="9" name="Content Placeholder 8">
+            <a:extLst>
+              <a:ext uri="{FF2B5EF4-FFF2-40B4-BE49-F238E27FC236}">
+                <a16:creationId xmlns:a16="http://schemas.microsoft.com/office/drawing/2014/main" id="{F08AD92E-C9AE-4177-BEC7-28B9DEC6FD4D}"/>
+              </a:ext>
+            </a:extLst>
+          </p:cNvPr>
+          <p:cNvPicPr>
+            <a:picLocks noGrp="1" noChangeAspect="1"/>
+          </p:cNvPicPr>
+          <p:nvPr>
+            <p:ph idx="1"/>
+          </p:nvPr>
+        </p:nvPicPr>
+        <p:blipFill>
+          <a:blip r:embed="rId2">
+            <a:extLst>
+              <a:ext uri="{28A0092B-C50C-407E-A947-70E740481C1C}">
+                <a14:useLocalDpi xmlns:a14="http://schemas.microsoft.com/office/drawing/2010/main" val="0"/>
+              </a:ext>
+            </a:extLst>
+          </a:blip>
+          <a:stretch>
+            <a:fillRect/>
+          </a:stretch>
+        </p:blipFill>
+        <p:spPr>
+          <a:xfrm>
+            <a:off x="1793615" y="1879145"/>
+            <a:ext cx="8604769" cy="4083155"/>
+          </a:xfrm>
+        </p:spPr>
+      </p:pic>
+    </p:spTree>
+    <p:extLst>
+      <p:ext uri="{BB962C8B-B14F-4D97-AF65-F5344CB8AC3E}">
+        <p14:creationId xmlns:p14="http://schemas.microsoft.com/office/powerpoint/2010/main" val="1968956266"/>
+      </p:ext>
+    </p:extLst>
+  </p:cSld>
+  <p:clrMapOvr>
+    <a:masterClrMapping/>
+  </p:clrMapOvr>
+</p:sld>
+</file>
+
+<file path=ppt/slides/slide4.xml><?xml version="1.0" encoding="utf-8"?>
+<p:sld xmlns:a="http://schemas.openxmlformats.org/drawingml/2006/main" xmlns:r="http://schemas.openxmlformats.org/officeDocument/2006/relationships" xmlns:p="http://schemas.openxmlformats.org/presentationml/2006/main">
+  <p:cSld>
+    <p:spTree>
+      <p:nvGrpSpPr>
+        <p:cNvPr id="1" name=""/>
+        <p:cNvGrpSpPr/>
+        <p:nvPr/>
+      </p:nvGrpSpPr>
+      <p:grpSpPr>
+        <a:xfrm>
+          <a:off x="0" y="0"/>
+          <a:ext cx="0" cy="0"/>
+          <a:chOff x="0" y="0"/>
+          <a:chExt cx="0" cy="0"/>
+        </a:xfrm>
+      </p:grpSpPr>
+      <p:sp>
+        <p:nvSpPr>
+          <p:cNvPr id="2" name="Title 1">
+            <a:extLst>
+              <a:ext uri="{FF2B5EF4-FFF2-40B4-BE49-F238E27FC236}">
+                <a16:creationId xmlns:a16="http://schemas.microsoft.com/office/drawing/2014/main" id="{46182B09-0B84-49D9-AA53-F59BC31E9C35}"/>
+              </a:ext>
+            </a:extLst>
+          </p:cNvPr>
+          <p:cNvSpPr>
+            <a:spLocks noGrp="1"/>
+          </p:cNvSpPr>
+          <p:nvPr>
+            <p:ph type="title"/>
+          </p:nvPr>
+        </p:nvSpPr>
+        <p:spPr/>
+        <p:txBody>
+          <a:bodyPr/>
+          <a:lstStyle/>
+          <a:p>
+            <a:pPr algn="ctr"/>
+            <a:r>
+              <a:rPr lang="en-IN" dirty="0"/>
+              <a:t>Background</a:t>
+            </a:r>
+          </a:p>
+        </p:txBody>
+      </p:sp>
+      <p:sp>
+        <p:nvSpPr>
+          <p:cNvPr id="3" name="Content Placeholder 2">
+            <a:extLst>
+              <a:ext uri="{FF2B5EF4-FFF2-40B4-BE49-F238E27FC236}">
+                <a16:creationId xmlns:a16="http://schemas.microsoft.com/office/drawing/2014/main" id="{8D4F455F-D798-494F-9C24-E9DC82CB8270}"/>
+              </a:ext>
+            </a:extLst>
+          </p:cNvPr>
+          <p:cNvSpPr>
+            <a:spLocks noGrp="1"/>
+          </p:cNvSpPr>
+          <p:nvPr>
+            <p:ph idx="1"/>
+          </p:nvPr>
+        </p:nvSpPr>
+        <p:spPr/>
+        <p:txBody>
+          <a:bodyPr/>
+          <a:lstStyle/>
+          <a:p>
+            <a:r>
+              <a:rPr lang="en-IN" dirty="0"/>
+              <a:t>Human body has electrical properties</a:t>
+            </a:r>
+          </a:p>
+          <a:p>
+            <a:pPr marL="0" indent="0">
+              <a:buNone/>
+            </a:pPr>
+            <a:endParaRPr lang="en-IN" dirty="0"/>
+          </a:p>
+          <a:p>
+            <a:r>
+              <a:rPr lang="en-US" dirty="0"/>
+              <a:t>Surface electrodes are attached to the skin around the body part</a:t>
+            </a:r>
+          </a:p>
+          <a:p>
+            <a:endParaRPr lang="en-US" dirty="0"/>
+          </a:p>
+          <a:p>
+            <a:r>
+              <a:rPr lang="en-US" dirty="0"/>
+              <a:t>Small alternating currents will be applied to the electrodes</a:t>
+            </a:r>
+          </a:p>
+          <a:p>
+            <a:endParaRPr lang="en-US" dirty="0"/>
+          </a:p>
+          <a:p>
+            <a:r>
+              <a:rPr lang="en-IN" dirty="0"/>
+              <a:t>Impedance is measured across electrodes </a:t>
+            </a:r>
+          </a:p>
+        </p:txBody>
+      </p:sp>
+    </p:spTree>
+    <p:extLst>
+      <p:ext uri="{BB962C8B-B14F-4D97-AF65-F5344CB8AC3E}">
+        <p14:creationId xmlns:p14="http://schemas.microsoft.com/office/powerpoint/2010/main" val="2754672498"/>
+      </p:ext>
+    </p:extLst>
+  </p:cSld>
+  <p:clrMapOvr>
+    <a:masterClrMapping/>
+  </p:clrMapOvr>
+</p:sld>
+</file>
+
+<file path=ppt/slides/slide5.xml><?xml version="1.0" encoding="utf-8"?>
+<p:sld xmlns:a="http://schemas.openxmlformats.org/drawingml/2006/main" xmlns:r="http://schemas.openxmlformats.org/officeDocument/2006/relationships" xmlns:p="http://schemas.openxmlformats.org/presentationml/2006/main">
+  <p:cSld>
+    <p:spTree>
+      <p:nvGrpSpPr>
+        <p:cNvPr id="1" name=""/>
+        <p:cNvGrpSpPr/>
+        <p:nvPr/>
+      </p:nvGrpSpPr>
+      <p:grpSpPr>
+        <a:xfrm>
+          <a:off x="0" y="0"/>
+          <a:ext cx="0" cy="0"/>
+          <a:chOff x="0" y="0"/>
+          <a:chExt cx="0" cy="0"/>
+        </a:xfrm>
+      </p:grpSpPr>
+      <p:sp>
+        <p:nvSpPr>
+          <p:cNvPr id="2" name="Title 1">
+            <a:extLst>
+              <a:ext uri="{FF2B5EF4-FFF2-40B4-BE49-F238E27FC236}">
+                <a16:creationId xmlns:a16="http://schemas.microsoft.com/office/drawing/2014/main" id="{46182B09-0B84-49D9-AA53-F59BC31E9C35}"/>
+              </a:ext>
+            </a:extLst>
+          </p:cNvPr>
+          <p:cNvSpPr>
+            <a:spLocks noGrp="1"/>
+          </p:cNvSpPr>
+          <p:nvPr>
+            <p:ph type="title"/>
+          </p:nvPr>
+        </p:nvSpPr>
+        <p:spPr/>
+        <p:txBody>
+          <a:bodyPr/>
+          <a:lstStyle/>
+          <a:p>
+            <a:pPr algn="ctr"/>
+            <a:r>
+              <a:rPr lang="en-IN" dirty="0"/>
+              <a:t>Methodology</a:t>
+            </a:r>
+          </a:p>
+        </p:txBody>
+      </p:sp>
+      <p:sp>
+        <p:nvSpPr>
+          <p:cNvPr id="3" name="Content Placeholder 2">
+            <a:extLst>
+              <a:ext uri="{FF2B5EF4-FFF2-40B4-BE49-F238E27FC236}">
+                <a16:creationId xmlns:a16="http://schemas.microsoft.com/office/drawing/2014/main" id="{8D4F455F-D798-494F-9C24-E9DC82CB8270}"/>
+              </a:ext>
+            </a:extLst>
+          </p:cNvPr>
+          <p:cNvSpPr>
+            <a:spLocks noGrp="1"/>
+          </p:cNvSpPr>
+          <p:nvPr>
+            <p:ph idx="1"/>
+          </p:nvPr>
+        </p:nvSpPr>
+        <p:spPr/>
+        <p:txBody>
+          <a:bodyPr>
+            <a:normAutofit lnSpcReduction="10000"/>
+          </a:bodyPr>
+          <a:lstStyle/>
+          <a:p>
+            <a:r>
+              <a:rPr lang="en-IN" dirty="0"/>
+              <a:t>Sample image is imported using OpenCV and is converted into a 2D Matrix</a:t>
+            </a:r>
+          </a:p>
+          <a:p>
+            <a:endParaRPr lang="en-IN" dirty="0"/>
+          </a:p>
+          <a:p>
+            <a:r>
+              <a:rPr lang="en-IN" dirty="0"/>
+              <a:t>To simplify the process, it is converted to grayscale</a:t>
+            </a:r>
+          </a:p>
+          <a:p>
+            <a:pPr marL="0" indent="0">
+              <a:buNone/>
+            </a:pPr>
+            <a:endParaRPr lang="en-IN" dirty="0"/>
+          </a:p>
+          <a:p>
+            <a:r>
+              <a:rPr lang="en-US" dirty="0"/>
+              <a:t>Each value in the matrix represents intensities of either black or white (0 being black and 1 being white)</a:t>
+            </a:r>
+          </a:p>
+          <a:p>
+            <a:endParaRPr lang="en-US" dirty="0"/>
+          </a:p>
+          <a:p>
+            <a:r>
+              <a:rPr lang="en-IN" dirty="0"/>
+              <a:t>1000 random-related images are created based on the matrices and its values</a:t>
+            </a:r>
+          </a:p>
+          <a:p>
+            <a:endParaRPr lang="en-US" dirty="0"/>
+          </a:p>
+        </p:txBody>
+      </p:sp>
+    </p:spTree>
+    <p:extLst>
+      <p:ext uri="{BB962C8B-B14F-4D97-AF65-F5344CB8AC3E}">
+        <p14:creationId xmlns:p14="http://schemas.microsoft.com/office/powerpoint/2010/main" val="3526956426"/>
+      </p:ext>
+    </p:extLst>
+  </p:cSld>
+  <p:clrMapOvr>
+    <a:masterClrMapping/>
+  </p:clrMapOvr>
+</p:sld>
+</file>
+
+<file path=ppt/slides/slide6.xml><?xml version="1.0" encoding="utf-8"?>
+<p:sld xmlns:a="http://schemas.openxmlformats.org/drawingml/2006/main" xmlns:r="http://schemas.openxmlformats.org/officeDocument/2006/relationships" xmlns:p="http://schemas.openxmlformats.org/presentationml/2006/main">
+  <p:cSld>
+    <p:spTree>
+      <p:nvGrpSpPr>
+        <p:cNvPr id="1" name=""/>
+        <p:cNvGrpSpPr/>
+        <p:nvPr/>
+      </p:nvGrpSpPr>
+      <p:grpSpPr>
+        <a:xfrm>
+          <a:off x="0" y="0"/>
+          <a:ext cx="0" cy="0"/>
+          <a:chOff x="0" y="0"/>
+          <a:chExt cx="0" cy="0"/>
+        </a:xfrm>
+      </p:grpSpPr>
+      <p:sp>
+        <p:nvSpPr>
+          <p:cNvPr id="2" name="Title 1">
+            <a:extLst>
+              <a:ext uri="{FF2B5EF4-FFF2-40B4-BE49-F238E27FC236}">
+                <a16:creationId xmlns:a16="http://schemas.microsoft.com/office/drawing/2014/main" id="{1DF9B4CF-F41F-4EC3-8B7D-C3DBD3A41EA8}"/>
+              </a:ext>
+            </a:extLst>
+          </p:cNvPr>
+          <p:cNvSpPr>
+            <a:spLocks noGrp="1"/>
+          </p:cNvSpPr>
+          <p:nvPr>
+            <p:ph type="title"/>
+          </p:nvPr>
+        </p:nvSpPr>
+        <p:spPr/>
+        <p:txBody>
+          <a:bodyPr/>
+          <a:lstStyle/>
+          <a:p>
+            <a:pPr algn="ctr"/>
+            <a:r>
+              <a:rPr lang="en-IN" dirty="0"/>
+              <a:t>Methodology</a:t>
+            </a:r>
+          </a:p>
+        </p:txBody>
+      </p:sp>
+      <p:sp>
+        <p:nvSpPr>
+          <p:cNvPr id="3" name="Content Placeholder 2">
+            <a:extLst>
+              <a:ext uri="{FF2B5EF4-FFF2-40B4-BE49-F238E27FC236}">
+                <a16:creationId xmlns:a16="http://schemas.microsoft.com/office/drawing/2014/main" id="{1DC37106-73DB-45AF-A869-7415D744EAD5}"/>
+              </a:ext>
+            </a:extLst>
+          </p:cNvPr>
+          <p:cNvSpPr>
+            <a:spLocks noGrp="1"/>
+          </p:cNvSpPr>
+          <p:nvPr>
+            <p:ph idx="1"/>
+          </p:nvPr>
+        </p:nvSpPr>
+        <p:spPr/>
+        <p:txBody>
+          <a:bodyPr>
+            <a:normAutofit/>
+          </a:bodyPr>
+          <a:lstStyle/>
+          <a:p>
+            <a:r>
+              <a:rPr lang="en-IN" dirty="0"/>
+              <a:t>The generated images are read back into code</a:t>
+            </a:r>
+          </a:p>
+          <a:p>
+            <a:pPr marL="0" indent="0">
+              <a:buNone/>
+            </a:pPr>
+            <a:endParaRPr lang="en-IN" dirty="0"/>
+          </a:p>
+          <a:p>
+            <a:r>
+              <a:rPr lang="en-IN" dirty="0"/>
+              <a:t>Images with higher intensities are labelled as affected images programmatically</a:t>
+            </a:r>
+          </a:p>
+          <a:p>
+            <a:pPr marL="0" indent="0">
+              <a:buNone/>
+            </a:pPr>
+            <a:endParaRPr lang="en-IN" dirty="0"/>
+          </a:p>
+          <a:p>
+            <a:r>
+              <a:rPr lang="en-IN" dirty="0"/>
+              <a:t>A dataset is created based on the number of pixels in the image</a:t>
+            </a:r>
+          </a:p>
+          <a:p>
+            <a:endParaRPr lang="en-IN" dirty="0"/>
+          </a:p>
+          <a:p>
+            <a:r>
+              <a:rPr lang="en-IN" dirty="0"/>
+              <a:t>Mean intensity ranges are calculated and are assigned labels (colours) correspondingly</a:t>
+            </a:r>
+          </a:p>
+          <a:p>
+            <a:endParaRPr lang="en-IN" dirty="0"/>
+          </a:p>
+          <a:p>
+            <a:endParaRPr lang="en-IN" dirty="0"/>
+          </a:p>
+          <a:p>
+            <a:endParaRPr lang="en-IN" dirty="0"/>
+          </a:p>
+        </p:txBody>
+      </p:sp>
+    </p:spTree>
+    <p:extLst>
+      <p:ext uri="{BB962C8B-B14F-4D97-AF65-F5344CB8AC3E}">
+        <p14:creationId xmlns:p14="http://schemas.microsoft.com/office/powerpoint/2010/main" val="1555146656"/>
+      </p:ext>
+    </p:extLst>
+  </p:cSld>
+  <p:clrMapOvr>
+    <a:masterClrMapping/>
+  </p:clrMapOvr>
+</p:sld>
+</file>
+
+<file path=ppt/slides/slide7.xml><?xml version="1.0" encoding="utf-8"?>
+<p:sld xmlns:a="http://schemas.openxmlformats.org/drawingml/2006/main" xmlns:r="http://schemas.openxmlformats.org/officeDocument/2006/relationships" xmlns:p="http://schemas.openxmlformats.org/presentationml/2006/main">
+  <p:cSld>
+    <p:spTree>
+      <p:nvGrpSpPr>
+        <p:cNvPr id="1" name=""/>
+        <p:cNvGrpSpPr/>
+        <p:nvPr/>
+      </p:nvGrpSpPr>
+      <p:grpSpPr>
+        <a:xfrm>
+          <a:off x="0" y="0"/>
+          <a:ext cx="0" cy="0"/>
+          <a:chOff x="0" y="0"/>
+          <a:chExt cx="0" cy="0"/>
+        </a:xfrm>
+      </p:grpSpPr>
+      <p:sp>
+        <p:nvSpPr>
+          <p:cNvPr id="2" name="Title 1">
+            <a:extLst>
+              <a:ext uri="{FF2B5EF4-FFF2-40B4-BE49-F238E27FC236}">
+                <a16:creationId xmlns:a16="http://schemas.microsoft.com/office/drawing/2014/main" id="{1DF9B4CF-F41F-4EC3-8B7D-C3DBD3A41EA8}"/>
+              </a:ext>
+            </a:extLst>
+          </p:cNvPr>
+          <p:cNvSpPr>
+            <a:spLocks noGrp="1"/>
+          </p:cNvSpPr>
+          <p:nvPr>
+            <p:ph type="title"/>
+          </p:nvPr>
+        </p:nvSpPr>
+        <p:spPr/>
+        <p:txBody>
+          <a:bodyPr/>
+          <a:lstStyle/>
+          <a:p>
+            <a:pPr algn="ctr"/>
+            <a:r>
+              <a:rPr lang="en-IN" dirty="0"/>
+              <a:t>Methodology</a:t>
+            </a:r>
+          </a:p>
+        </p:txBody>
+      </p:sp>
+      <p:sp>
+        <p:nvSpPr>
+          <p:cNvPr id="3" name="Content Placeholder 2">
+            <a:extLst>
+              <a:ext uri="{FF2B5EF4-FFF2-40B4-BE49-F238E27FC236}">
+                <a16:creationId xmlns:a16="http://schemas.microsoft.com/office/drawing/2014/main" id="{1DC37106-73DB-45AF-A869-7415D744EAD5}"/>
+              </a:ext>
+            </a:extLst>
+          </p:cNvPr>
+          <p:cNvSpPr>
+            <a:spLocks noGrp="1"/>
+          </p:cNvSpPr>
+          <p:nvPr>
+            <p:ph idx="1"/>
+          </p:nvPr>
+        </p:nvSpPr>
+        <p:spPr/>
+        <p:txBody>
+          <a:bodyPr>
+            <a:normAutofit lnSpcReduction="10000"/>
+          </a:bodyPr>
+          <a:lstStyle/>
+          <a:p>
+            <a:r>
+              <a:rPr lang="en-IN" dirty="0"/>
+              <a:t>A dataset of 8 intensity ranges (columns) and 1000 values (rows) are created</a:t>
+            </a:r>
+          </a:p>
+          <a:p>
+            <a:endParaRPr lang="en-IN" dirty="0"/>
+          </a:p>
+          <a:p>
+            <a:r>
+              <a:rPr lang="en-IN" dirty="0"/>
+              <a:t>Binary targets are generated and are appended to the existing dataset as a target column</a:t>
+            </a:r>
+          </a:p>
+          <a:p>
+            <a:endParaRPr lang="en-IN" dirty="0"/>
+          </a:p>
+          <a:p>
+            <a:r>
+              <a:rPr lang="en-IN" dirty="0"/>
+              <a:t>If the pixel count is more than the mean, the image is categorised as ‘1’</a:t>
+            </a:r>
+          </a:p>
+          <a:p>
+            <a:endParaRPr lang="en-IN" dirty="0"/>
+          </a:p>
+          <a:p>
+            <a:r>
+              <a:rPr lang="en-IN" dirty="0"/>
+              <a:t>If the pixel count is less than the mean, the image is categorised as ‘0’</a:t>
+            </a:r>
+          </a:p>
+        </p:txBody>
+      </p:sp>
+    </p:spTree>
+    <p:extLst>
+      <p:ext uri="{BB962C8B-B14F-4D97-AF65-F5344CB8AC3E}">
+        <p14:creationId xmlns:p14="http://schemas.microsoft.com/office/powerpoint/2010/main" val="2545900518"/>
+      </p:ext>
+    </p:extLst>
+  </p:cSld>
+  <p:clrMapOvr>
+    <a:masterClrMapping/>
+  </p:clrMapOvr>
+</p:sld>
+</file>
+
+<file path=ppt/slides/slide8.xml><?xml version="1.0" encoding="utf-8"?>
+<p:sld xmlns:a="http://schemas.openxmlformats.org/drawingml/2006/main" xmlns:r="http://schemas.openxmlformats.org/officeDocument/2006/relationships" xmlns:p="http://schemas.openxmlformats.org/presentationml/2006/main">
+  <p:cSld>
+    <p:spTree>
+      <p:nvGrpSpPr>
+        <p:cNvPr id="1" name=""/>
+        <p:cNvGrpSpPr/>
+        <p:nvPr/>
+      </p:nvGrpSpPr>
+      <p:grpSpPr>
+        <a:xfrm>
+          <a:off x="0" y="0"/>
+          <a:ext cx="0" cy="0"/>
+          <a:chOff x="0" y="0"/>
+          <a:chExt cx="0" cy="0"/>
+        </a:xfrm>
+      </p:grpSpPr>
+      <p:sp>
+        <p:nvSpPr>
+          <p:cNvPr id="2" name="Title 1">
+            <a:extLst>
+              <a:ext uri="{FF2B5EF4-FFF2-40B4-BE49-F238E27FC236}">
+                <a16:creationId xmlns:a16="http://schemas.microsoft.com/office/drawing/2014/main" id="{6E34496D-787C-464D-9CBC-D872C3C54BF5}"/>
+              </a:ext>
+            </a:extLst>
+          </p:cNvPr>
+          <p:cNvSpPr>
+            <a:spLocks noGrp="1"/>
+          </p:cNvSpPr>
+          <p:nvPr>
+            <p:ph type="title"/>
+          </p:nvPr>
+        </p:nvSpPr>
+        <p:spPr/>
+        <p:txBody>
+          <a:bodyPr/>
+          <a:lstStyle/>
+          <a:p>
+            <a:pPr algn="ctr"/>
+            <a:r>
+              <a:rPr lang="en-IN" dirty="0"/>
+              <a:t>Sample Image Generated</a:t>
+            </a:r>
+          </a:p>
+        </p:txBody>
+      </p:sp>
+      <p:pic>
+        <p:nvPicPr>
+          <p:cNvPr id="7" name="Content Placeholder 6">
+            <a:extLst>
+              <a:ext uri="{FF2B5EF4-FFF2-40B4-BE49-F238E27FC236}">
+                <a16:creationId xmlns:a16="http://schemas.microsoft.com/office/drawing/2014/main" id="{BEBB1E4C-3979-48FB-8276-33AC6FF9FA19}"/>
+              </a:ext>
+            </a:extLst>
+          </p:cNvPr>
+          <p:cNvPicPr>
+            <a:picLocks noGrp="1" noChangeAspect="1"/>
+          </p:cNvPicPr>
+          <p:nvPr>
+            <p:ph sz="half" idx="1"/>
+          </p:nvPr>
+        </p:nvPicPr>
+        <p:blipFill>
+          <a:blip r:embed="rId3">
+            <a:extLst>
+              <a:ext uri="{28A0092B-C50C-407E-A947-70E740481C1C}">
+                <a14:useLocalDpi xmlns:a14="http://schemas.microsoft.com/office/drawing/2010/main" val="0"/>
+              </a:ext>
+            </a:extLst>
+          </a:blip>
+          <a:stretch>
+            <a:fillRect/>
+          </a:stretch>
+        </p:blipFill>
+        <p:spPr>
+          <a:xfrm>
+            <a:off x="634979" y="1754158"/>
+            <a:ext cx="5784481" cy="4494271"/>
+          </a:xfrm>
+        </p:spPr>
+      </p:pic>
+      <p:sp>
+        <p:nvSpPr>
+          <p:cNvPr id="5" name="Content Placeholder 4">
+            <a:extLst>
+              <a:ext uri="{FF2B5EF4-FFF2-40B4-BE49-F238E27FC236}">
+                <a16:creationId xmlns:a16="http://schemas.microsoft.com/office/drawing/2014/main" id="{3EF0BC74-48E3-4A75-A49D-C582CBBC47BB}"/>
+              </a:ext>
+            </a:extLst>
+          </p:cNvPr>
+          <p:cNvSpPr>
+            <a:spLocks noGrp="1"/>
+          </p:cNvSpPr>
+          <p:nvPr>
+            <p:ph sz="half" idx="2"/>
+          </p:nvPr>
+        </p:nvSpPr>
+        <p:spPr/>
+        <p:txBody>
+          <a:bodyPr/>
+          <a:lstStyle/>
+          <a:p>
+            <a:r>
+              <a:rPr lang="en-IN" dirty="0"/>
+              <a:t>The range of values are assigned colours only for the purpose of representation</a:t>
+            </a:r>
+          </a:p>
+          <a:p>
+            <a:endParaRPr lang="en-IN" dirty="0"/>
+          </a:p>
+          <a:p>
+            <a:r>
+              <a:rPr lang="en-IN" dirty="0"/>
+              <a:t>Originally, the image is still grayscale</a:t>
+            </a:r>
+          </a:p>
+          <a:p>
+            <a:endParaRPr lang="en-IN" dirty="0"/>
+          </a:p>
+          <a:p>
+            <a:r>
+              <a:rPr lang="en-IN" dirty="0"/>
+              <a:t>The red region is considered affected</a:t>
+            </a:r>
+          </a:p>
+        </p:txBody>
+      </p:sp>
+    </p:spTree>
+    <p:extLst>
+      <p:ext uri="{BB962C8B-B14F-4D97-AF65-F5344CB8AC3E}">
+        <p14:creationId xmlns:p14="http://schemas.microsoft.com/office/powerpoint/2010/main" val="2759289731"/>
+      </p:ext>
+    </p:extLst>
+  </p:cSld>
+  <p:clrMapOvr>
+    <a:masterClrMapping/>
+  </p:clrMapOvr>
+</p:sld>
+</file>
+
+<file path=ppt/slides/slide9.xml><?xml version="1.0" encoding="utf-8"?>
+<p:sld xmlns:a="http://schemas.openxmlformats.org/drawingml/2006/main" xmlns:r="http://schemas.openxmlformats.org/officeDocument/2006/relationships" xmlns:p="http://schemas.openxmlformats.org/presentationml/2006/main">
+  <p:cSld>
+    <p:spTree>
+      <p:nvGrpSpPr>
+        <p:cNvPr id="1" name=""/>
+        <p:cNvGrpSpPr/>
+        <p:nvPr/>
+      </p:nvGrpSpPr>
+      <p:grpSpPr>
+        <a:xfrm>
+          <a:off x="0" y="0"/>
+          <a:ext cx="0" cy="0"/>
+          <a:chOff x="0" y="0"/>
+          <a:chExt cx="0" cy="0"/>
+        </a:xfrm>
+      </p:grpSpPr>
+      <p:sp>
+        <p:nvSpPr>
+          <p:cNvPr id="2" name="Title 1">
+            <a:extLst>
+              <a:ext uri="{FF2B5EF4-FFF2-40B4-BE49-F238E27FC236}">
+                <a16:creationId xmlns:a16="http://schemas.microsoft.com/office/drawing/2014/main" id="{46182B09-0B84-49D9-AA53-F59BC31E9C35}"/>
+              </a:ext>
+            </a:extLst>
+          </p:cNvPr>
+          <p:cNvSpPr>
+            <a:spLocks noGrp="1"/>
+          </p:cNvSpPr>
+          <p:nvPr>
+            <p:ph type="title"/>
+          </p:nvPr>
+        </p:nvSpPr>
+        <p:spPr/>
+        <p:txBody>
+          <a:bodyPr/>
+          <a:lstStyle/>
+          <a:p>
+            <a:pPr algn="ctr"/>
+            <a:r>
+              <a:rPr lang="en-IN" dirty="0"/>
+              <a:t>Machine Learning</a:t>
+            </a:r>
+          </a:p>
+        </p:txBody>
+      </p:sp>
+      <p:sp>
+        <p:nvSpPr>
+          <p:cNvPr id="3" name="Content Placeholder 2">
+            <a:extLst>
+              <a:ext uri="{FF2B5EF4-FFF2-40B4-BE49-F238E27FC236}">
+                <a16:creationId xmlns:a16="http://schemas.microsoft.com/office/drawing/2014/main" id="{8D4F455F-D798-494F-9C24-E9DC82CB8270}"/>
+              </a:ext>
+            </a:extLst>
+          </p:cNvPr>
+          <p:cNvSpPr>
+            <a:spLocks noGrp="1"/>
+          </p:cNvSpPr>
+          <p:nvPr>
+            <p:ph idx="1"/>
+          </p:nvPr>
+        </p:nvSpPr>
+        <p:spPr/>
+        <p:txBody>
+          <a:bodyPr>
+            <a:normAutofit lnSpcReduction="10000"/>
+          </a:bodyPr>
+          <a:lstStyle/>
+          <a:p>
+            <a:r>
+              <a:rPr lang="en-IN" dirty="0"/>
+              <a:t>Data attributes with pixel counts greater than zero are selected as features </a:t>
+            </a:r>
+          </a:p>
+          <a:p>
+            <a:endParaRPr lang="en-IN" dirty="0"/>
+          </a:p>
+          <a:p>
+            <a:r>
+              <a:rPr lang="en-IN" dirty="0"/>
+              <a:t>Data is split into training and test sets and the </a:t>
+            </a:r>
+            <a:r>
+              <a:rPr lang="en-US" dirty="0"/>
+              <a:t>model is trained on the training set</a:t>
+            </a:r>
+          </a:p>
+          <a:p>
+            <a:endParaRPr lang="en-US" dirty="0"/>
+          </a:p>
+          <a:p>
+            <a:r>
+              <a:rPr lang="en-US" dirty="0"/>
+              <a:t>The model is fit to the test set and values are predicted</a:t>
+            </a:r>
+          </a:p>
+          <a:p>
+            <a:endParaRPr lang="en-US" dirty="0"/>
+          </a:p>
+          <a:p>
+            <a:r>
+              <a:rPr lang="en-IN" dirty="0"/>
+              <a:t>Performance of various classification algorithms are measured using cross-validation</a:t>
+            </a:r>
+          </a:p>
+        </p:txBody>
+      </p:sp>
+    </p:spTree>
+    <p:extLst>
+      <p:ext uri="{BB962C8B-B14F-4D97-AF65-F5344CB8AC3E}">
+        <p14:creationId xmlns:p14="http://schemas.microsoft.com/office/powerpoint/2010/main" val="1148527351"/>
       </p:ext>
     </p:extLst>
   </p:cSld>

</xml_diff>